<commit_message>
Reorder slide and add time budget
</commit_message>
<xml_diff>
--- a/14 Cpp Features in 40 Minutes.pptx
+++ b/14 Cpp Features in 40 Minutes.pptx
@@ -17,18 +17,18 @@
     <p:sldId id="338" r:id="rId8"/>
     <p:sldId id="339" r:id="rId9"/>
     <p:sldId id="275" r:id="rId10"/>
-    <p:sldId id="257" r:id="rId11"/>
-    <p:sldId id="276" r:id="rId12"/>
-    <p:sldId id="277" r:id="rId13"/>
-    <p:sldId id="278" r:id="rId14"/>
+    <p:sldId id="278" r:id="rId11"/>
+    <p:sldId id="335" r:id="rId12"/>
+    <p:sldId id="257" r:id="rId13"/>
+    <p:sldId id="277" r:id="rId14"/>
     <p:sldId id="279" r:id="rId15"/>
     <p:sldId id="280" r:id="rId16"/>
-    <p:sldId id="335" r:id="rId17"/>
-    <p:sldId id="281" r:id="rId18"/>
-    <p:sldId id="283" r:id="rId19"/>
-    <p:sldId id="266" r:id="rId20"/>
-    <p:sldId id="282" r:id="rId21"/>
-    <p:sldId id="284" r:id="rId22"/>
+    <p:sldId id="281" r:id="rId17"/>
+    <p:sldId id="283" r:id="rId18"/>
+    <p:sldId id="266" r:id="rId19"/>
+    <p:sldId id="282" r:id="rId20"/>
+    <p:sldId id="284" r:id="rId21"/>
+    <p:sldId id="359" r:id="rId22"/>
     <p:sldId id="285" r:id="rId23"/>
     <p:sldId id="286" r:id="rId24"/>
     <p:sldId id="287" r:id="rId25"/>
@@ -180,87 +180,6 @@
     </a:lvl9pPr>
   </p:defaultTextStyle>
   <p:extLst>
-    <p:ext uri="{521415D9-36F7-43E2-AB2F-B90AF26B5E84}">
-      <p14:sectionLst xmlns:p14="http://schemas.microsoft.com/office/powerpoint/2010/main">
-        <p14:section name="Default Section" id="{939D4672-6BC9-46F3-9502-DF84C4BEE78A}">
-          <p14:sldIdLst>
-            <p14:sldId id="256"/>
-            <p14:sldId id="290"/>
-            <p14:sldId id="263"/>
-            <p14:sldId id="261"/>
-            <p14:sldId id="340"/>
-            <p14:sldId id="260"/>
-            <p14:sldId id="338"/>
-            <p14:sldId id="339"/>
-            <p14:sldId id="275"/>
-            <p14:sldId id="257"/>
-            <p14:sldId id="276"/>
-            <p14:sldId id="277"/>
-            <p14:sldId id="278"/>
-            <p14:sldId id="279"/>
-            <p14:sldId id="280"/>
-            <p14:sldId id="335"/>
-            <p14:sldId id="281"/>
-            <p14:sldId id="283"/>
-            <p14:sldId id="266"/>
-            <p14:sldId id="282"/>
-            <p14:sldId id="284"/>
-            <p14:sldId id="285"/>
-            <p14:sldId id="286"/>
-            <p14:sldId id="287"/>
-            <p14:sldId id="288"/>
-            <p14:sldId id="292"/>
-            <p14:sldId id="325"/>
-            <p14:sldId id="324"/>
-            <p14:sldId id="294"/>
-            <p14:sldId id="295"/>
-            <p14:sldId id="298"/>
-            <p14:sldId id="323"/>
-            <p14:sldId id="320"/>
-            <p14:sldId id="293"/>
-            <p14:sldId id="259"/>
-            <p14:sldId id="336"/>
-            <p14:sldId id="316"/>
-            <p14:sldId id="337"/>
-            <p14:sldId id="264"/>
-            <p14:sldId id="270"/>
-            <p14:sldId id="351"/>
-            <p14:sldId id="327"/>
-            <p14:sldId id="328"/>
-            <p14:sldId id="291"/>
-            <p14:sldId id="329"/>
-            <p14:sldId id="330"/>
-            <p14:sldId id="341"/>
-            <p14:sldId id="299"/>
-            <p14:sldId id="301"/>
-            <p14:sldId id="333"/>
-            <p14:sldId id="302"/>
-            <p14:sldId id="303"/>
-            <p14:sldId id="304"/>
-            <p14:sldId id="269"/>
-            <p14:sldId id="350"/>
-            <p14:sldId id="271"/>
-            <p14:sldId id="343"/>
-            <p14:sldId id="342"/>
-            <p14:sldId id="344"/>
-            <p14:sldId id="345"/>
-            <p14:sldId id="348"/>
-            <p14:sldId id="346"/>
-            <p14:sldId id="347"/>
-            <p14:sldId id="273"/>
-            <p14:sldId id="355"/>
-            <p14:sldId id="262"/>
-            <p14:sldId id="352"/>
-            <p14:sldId id="353"/>
-            <p14:sldId id="354"/>
-            <p14:sldId id="357"/>
-            <p14:sldId id="274"/>
-            <p14:sldId id="356"/>
-            <p14:sldId id="358"/>
-          </p14:sldIdLst>
-        </p14:section>
-      </p14:sectionLst>
-    </p:ext>
     <p:ext uri="{EFAFB233-063F-42B5-8137-9DF3F51BA10A}">
       <p15:sldGuideLst xmlns:p15="http://schemas.microsoft.com/office/powerpoint/2012/main"/>
     </p:ext>
@@ -843,7 +762,7 @@
           <a:p>
             <a:fld id="{054D983A-E425-4A34-BCDB-40ADE3B9F73D}" type="datetimeFigureOut">
               <a:rPr lang="en-US" smtClean="0"/>
-              <a:t>6/13/2019</a:t>
+              <a:t>6/14/2019</a:t>
             </a:fld>
             <a:endParaRPr lang="en-US"/>
           </a:p>
@@ -2077,7 +1996,7 @@
           <a:p>
             <a:fld id="{FFD3BF37-8D16-4179-99C3-318EDB0DC7CB}" type="datetimeFigureOut">
               <a:rPr lang="en-US" smtClean="0"/>
-              <a:t>6/13/2019</a:t>
+              <a:t>6/14/2019</a:t>
             </a:fld>
             <a:endParaRPr lang="en-US"/>
           </a:p>
@@ -2275,7 +2194,7 @@
           <a:p>
             <a:fld id="{FFD3BF37-8D16-4179-99C3-318EDB0DC7CB}" type="datetimeFigureOut">
               <a:rPr lang="en-US" smtClean="0"/>
-              <a:t>6/13/2019</a:t>
+              <a:t>6/14/2019</a:t>
             </a:fld>
             <a:endParaRPr lang="en-US"/>
           </a:p>
@@ -2483,7 +2402,7 @@
           <a:p>
             <a:fld id="{FFD3BF37-8D16-4179-99C3-318EDB0DC7CB}" type="datetimeFigureOut">
               <a:rPr lang="en-US" smtClean="0"/>
-              <a:t>6/13/2019</a:t>
+              <a:t>6/14/2019</a:t>
             </a:fld>
             <a:endParaRPr lang="en-US"/>
           </a:p>
@@ -2681,7 +2600,7 @@
           <a:p>
             <a:fld id="{FFD3BF37-8D16-4179-99C3-318EDB0DC7CB}" type="datetimeFigureOut">
               <a:rPr lang="en-US" smtClean="0"/>
-              <a:t>6/13/2019</a:t>
+              <a:t>6/14/2019</a:t>
             </a:fld>
             <a:endParaRPr lang="en-US"/>
           </a:p>
@@ -2956,7 +2875,7 @@
           <a:p>
             <a:fld id="{FFD3BF37-8D16-4179-99C3-318EDB0DC7CB}" type="datetimeFigureOut">
               <a:rPr lang="en-US" smtClean="0"/>
-              <a:t>6/13/2019</a:t>
+              <a:t>6/14/2019</a:t>
             </a:fld>
             <a:endParaRPr lang="en-US"/>
           </a:p>
@@ -3221,7 +3140,7 @@
           <a:p>
             <a:fld id="{FFD3BF37-8D16-4179-99C3-318EDB0DC7CB}" type="datetimeFigureOut">
               <a:rPr lang="en-US" smtClean="0"/>
-              <a:t>6/13/2019</a:t>
+              <a:t>6/14/2019</a:t>
             </a:fld>
             <a:endParaRPr lang="en-US"/>
           </a:p>
@@ -3633,7 +3552,7 @@
           <a:p>
             <a:fld id="{FFD3BF37-8D16-4179-99C3-318EDB0DC7CB}" type="datetimeFigureOut">
               <a:rPr lang="en-US" smtClean="0"/>
-              <a:t>6/13/2019</a:t>
+              <a:t>6/14/2019</a:t>
             </a:fld>
             <a:endParaRPr lang="en-US"/>
           </a:p>
@@ -3774,7 +3693,7 @@
           <a:p>
             <a:fld id="{FFD3BF37-8D16-4179-99C3-318EDB0DC7CB}" type="datetimeFigureOut">
               <a:rPr lang="en-US" smtClean="0"/>
-              <a:t>6/13/2019</a:t>
+              <a:t>6/14/2019</a:t>
             </a:fld>
             <a:endParaRPr lang="en-US"/>
           </a:p>
@@ -3887,7 +3806,7 @@
           <a:p>
             <a:fld id="{FFD3BF37-8D16-4179-99C3-318EDB0DC7CB}" type="datetimeFigureOut">
               <a:rPr lang="en-US" smtClean="0"/>
-              <a:t>6/13/2019</a:t>
+              <a:t>6/14/2019</a:t>
             </a:fld>
             <a:endParaRPr lang="en-US"/>
           </a:p>
@@ -4198,7 +4117,7 @@
           <a:p>
             <a:fld id="{FFD3BF37-8D16-4179-99C3-318EDB0DC7CB}" type="datetimeFigureOut">
               <a:rPr lang="en-US" smtClean="0"/>
-              <a:t>6/13/2019</a:t>
+              <a:t>6/14/2019</a:t>
             </a:fld>
             <a:endParaRPr lang="en-US"/>
           </a:p>
@@ -4486,7 +4405,7 @@
           <a:p>
             <a:fld id="{FFD3BF37-8D16-4179-99C3-318EDB0DC7CB}" type="datetimeFigureOut">
               <a:rPr lang="en-US" smtClean="0"/>
-              <a:t>6/13/2019</a:t>
+              <a:t>6/14/2019</a:t>
             </a:fld>
             <a:endParaRPr lang="en-US"/>
           </a:p>
@@ -4727,7 +4646,7 @@
           <a:p>
             <a:fld id="{FFD3BF37-8D16-4179-99C3-318EDB0DC7CB}" type="datetimeFigureOut">
               <a:rPr lang="en-US" smtClean="0"/>
-              <a:t>6/13/2019</a:t>
+              <a:t>6/14/2019</a:t>
             </a:fld>
             <a:endParaRPr lang="en-US"/>
           </a:p>
@@ -5259,7 +5178,7 @@
           <p:cNvPr id="2" name="Title 1">
             <a:extLst>
               <a:ext uri="{FF2B5EF4-FFF2-40B4-BE49-F238E27FC236}">
-                <a16:creationId xmlns:a16="http://schemas.microsoft.com/office/drawing/2014/main" id="{F8D7EFA3-1ED3-4AEB-851A-131E7EB67CD4}"/>
+                <a16:creationId xmlns:a16="http://schemas.microsoft.com/office/drawing/2014/main" id="{E780FC5C-8A55-4472-9017-E1B6C53ED32B}"/>
               </a:ext>
             </a:extLst>
           </p:cNvPr>
@@ -5287,7 +5206,7 @@
           <p:cNvPr id="4" name="Rectangle 3">
             <a:extLst>
               <a:ext uri="{FF2B5EF4-FFF2-40B4-BE49-F238E27FC236}">
-                <a16:creationId xmlns:a16="http://schemas.microsoft.com/office/drawing/2014/main" id="{631D22A9-70E6-4721-B9D4-C5C29BEECFC0}"/>
+                <a16:creationId xmlns:a16="http://schemas.microsoft.com/office/drawing/2014/main" id="{2DD59A5C-3BEF-4680-8DA2-5C14A7C7DA5E}"/>
               </a:ext>
             </a:extLst>
           </p:cNvPr>
@@ -5296,8 +5215,8 @@
         </p:nvSpPr>
         <p:spPr>
           <a:xfrm>
-            <a:off x="638175" y="1279114"/>
-            <a:ext cx="10375446" cy="5693866"/>
+            <a:off x="1943021" y="3334138"/>
+            <a:ext cx="7470399" cy="830997"/>
           </a:xfrm>
           <a:prstGeom prst="rect">
             <a:avLst/>
@@ -5310,355 +5229,177 @@
           <a:lstStyle/>
           <a:p>
             <a:r>
-              <a:rPr lang="en-US" sz="2800" dirty="0">
+              <a:rPr lang="en-US" sz="4800" dirty="0">
                 <a:solidFill>
                   <a:srgbClr val="0000FF"/>
                 </a:solidFill>
                 <a:latin typeface="Consolas" panose="020B0609020204030204" pitchFamily="49" charset="0"/>
               </a:rPr>
-              <a:t>#include </a:t>
-            </a:r>
-            <a:r>
-              <a:rPr lang="en-US" sz="2800" dirty="0">
-                <a:solidFill>
-                  <a:srgbClr val="A31515"/>
-                </a:solidFill>
-                <a:latin typeface="Consolas" panose="020B0609020204030204" pitchFamily="49" charset="0"/>
-              </a:rPr>
-              <a:t>&lt;</a:t>
-            </a:r>
-            <a:r>
-              <a:rPr lang="en-US" sz="2800" dirty="0" err="1">
-                <a:solidFill>
-                  <a:srgbClr val="A31515"/>
-                </a:solidFill>
-                <a:latin typeface="Consolas" panose="020B0609020204030204" pitchFamily="49" charset="0"/>
-              </a:rPr>
-              <a:t>stdio.h</a:t>
-            </a:r>
-            <a:r>
-              <a:rPr lang="en-US" sz="2800" dirty="0">
-                <a:solidFill>
-                  <a:srgbClr val="A31515"/>
-                </a:solidFill>
-                <a:latin typeface="Consolas" panose="020B0609020204030204" pitchFamily="49" charset="0"/>
-              </a:rPr>
-              <a:t>&gt;</a:t>
-            </a:r>
-            <a:endParaRPr lang="en-US" sz="2800" dirty="0">
-              <a:solidFill>
-                <a:srgbClr val="000000"/>
-              </a:solidFill>
-              <a:latin typeface="Consolas" panose="020B0609020204030204" pitchFamily="49" charset="0"/>
-            </a:endParaRPr>
-          </a:p>
-          <a:p>
-            <a:br>
-              <a:rPr lang="en-US" sz="2800" dirty="0">
-                <a:solidFill>
-                  <a:srgbClr val="000000"/>
-                </a:solidFill>
-                <a:latin typeface="Consolas" panose="020B0609020204030204" pitchFamily="49" charset="0"/>
-              </a:rPr>
-            </a:br>
-            <a:r>
-              <a:rPr lang="en-US" sz="2800" dirty="0">
-                <a:solidFill>
-                  <a:srgbClr val="0000FF"/>
-                </a:solidFill>
-                <a:latin typeface="Consolas" panose="020B0609020204030204" pitchFamily="49" charset="0"/>
-              </a:rPr>
-              <a:t>struct</a:t>
-            </a:r>
-            <a:r>
-              <a:rPr lang="en-US" sz="2800" dirty="0">
-                <a:solidFill>
-                  <a:srgbClr val="000000"/>
-                </a:solidFill>
-                <a:latin typeface="Consolas" panose="020B0609020204030204" pitchFamily="49" charset="0"/>
-              </a:rPr>
-              <a:t> example {</a:t>
-            </a:r>
-          </a:p>
-          <a:p>
-            <a:r>
-              <a:rPr lang="en-US" sz="2800" dirty="0">
-                <a:solidFill>
-                  <a:srgbClr val="0000FF"/>
-                </a:solidFill>
-                <a:latin typeface="Consolas" panose="020B0609020204030204" pitchFamily="49" charset="0"/>
-              </a:rPr>
-              <a:t>    int</a:t>
-            </a:r>
-            <a:r>
-              <a:rPr lang="en-US" sz="2800" dirty="0">
-                <a:solidFill>
-                  <a:srgbClr val="000000"/>
-                </a:solidFill>
-                <a:latin typeface="Consolas" panose="020B0609020204030204" pitchFamily="49" charset="0"/>
-              </a:rPr>
-              <a:t> a;</a:t>
-            </a:r>
-          </a:p>
-          <a:p>
-            <a:r>
-              <a:rPr lang="en-US" sz="2800" dirty="0">
-                <a:solidFill>
-                  <a:srgbClr val="0000FF"/>
-                </a:solidFill>
-                <a:latin typeface="Consolas" panose="020B0609020204030204" pitchFamily="49" charset="0"/>
-              </a:rPr>
-              <a:t>    int</a:t>
-            </a:r>
-            <a:r>
-              <a:rPr lang="en-US" sz="2800" dirty="0">
-                <a:solidFill>
-                  <a:srgbClr val="000000"/>
-                </a:solidFill>
-                <a:latin typeface="Consolas" panose="020B0609020204030204" pitchFamily="49" charset="0"/>
-              </a:rPr>
-              <a:t> b;</a:t>
-            </a:r>
-          </a:p>
-          <a:p>
-            <a:r>
-              <a:rPr lang="en-US" sz="2800" dirty="0">
-                <a:solidFill>
-                  <a:srgbClr val="0000FF"/>
-                </a:solidFill>
-                <a:latin typeface="Consolas" panose="020B0609020204030204" pitchFamily="49" charset="0"/>
-              </a:rPr>
-              <a:t>    int</a:t>
-            </a:r>
-            <a:r>
-              <a:rPr lang="en-US" sz="2800" dirty="0">
-                <a:solidFill>
-                  <a:srgbClr val="000000"/>
-                </a:solidFill>
-                <a:latin typeface="Consolas" panose="020B0609020204030204" pitchFamily="49" charset="0"/>
-              </a:rPr>
-              <a:t> c;</a:t>
-            </a:r>
-          </a:p>
-          <a:p>
-            <a:r>
-              <a:rPr lang="en-US" sz="2800" dirty="0">
-                <a:solidFill>
-                  <a:srgbClr val="000000"/>
-                </a:solidFill>
-                <a:latin typeface="Consolas" panose="020B0609020204030204" pitchFamily="49" charset="0"/>
-              </a:rPr>
-              <a:t>};</a:t>
-            </a:r>
-          </a:p>
-          <a:p>
-            <a:br>
-              <a:rPr lang="en-US" sz="2800" dirty="0">
-                <a:solidFill>
-                  <a:srgbClr val="000000"/>
-                </a:solidFill>
-                <a:latin typeface="Consolas" panose="020B0609020204030204" pitchFamily="49" charset="0"/>
-              </a:rPr>
-            </a:br>
-            <a:r>
-              <a:rPr lang="en-US" sz="2800" dirty="0">
-                <a:solidFill>
-                  <a:srgbClr val="0000FF"/>
-                </a:solidFill>
-                <a:latin typeface="Consolas" panose="020B0609020204030204" pitchFamily="49" charset="0"/>
-              </a:rPr>
-              <a:t>void</a:t>
-            </a:r>
-            <a:r>
-              <a:rPr lang="en-US" sz="2800" dirty="0">
-                <a:solidFill>
-                  <a:srgbClr val="000000"/>
-                </a:solidFill>
-                <a:latin typeface="Consolas" panose="020B0609020204030204" pitchFamily="49" charset="0"/>
-              </a:rPr>
-              <a:t> </a:t>
-            </a:r>
-            <a:r>
-              <a:rPr lang="en-US" sz="2800" dirty="0" err="1">
-                <a:solidFill>
-                  <a:srgbClr val="000000"/>
-                </a:solidFill>
-                <a:latin typeface="Consolas" panose="020B0609020204030204" pitchFamily="49" charset="0"/>
-              </a:rPr>
-              <a:t>print_example</a:t>
-            </a:r>
-            <a:r>
-              <a:rPr lang="en-US" sz="2800" dirty="0">
-                <a:solidFill>
-                  <a:srgbClr val="000000"/>
-                </a:solidFill>
-                <a:latin typeface="Consolas" panose="020B0609020204030204" pitchFamily="49" charset="0"/>
-              </a:rPr>
-              <a:t>(</a:t>
-            </a:r>
-            <a:r>
-              <a:rPr lang="en-US" sz="2800" dirty="0">
-                <a:solidFill>
-                  <a:srgbClr val="0000FF"/>
-                </a:solidFill>
-                <a:latin typeface="Consolas" panose="020B0609020204030204" pitchFamily="49" charset="0"/>
-              </a:rPr>
-              <a:t>const</a:t>
-            </a:r>
-            <a:r>
-              <a:rPr lang="en-US" sz="2800" dirty="0">
-                <a:solidFill>
-                  <a:srgbClr val="000000"/>
-                </a:solidFill>
-                <a:latin typeface="Consolas" panose="020B0609020204030204" pitchFamily="49" charset="0"/>
-              </a:rPr>
-              <a:t> example&amp; ex) {</a:t>
-            </a:r>
-          </a:p>
-          <a:p>
-            <a:r>
-              <a:rPr lang="en-US" sz="2800" dirty="0">
-                <a:solidFill>
-                  <a:srgbClr val="000000"/>
-                </a:solidFill>
-                <a:latin typeface="Consolas" panose="020B0609020204030204" pitchFamily="49" charset="0"/>
-              </a:rPr>
-              <a:t>    </a:t>
-            </a:r>
-            <a:r>
-              <a:rPr lang="en-US" sz="2800" dirty="0" err="1">
-                <a:solidFill>
-                  <a:srgbClr val="000000"/>
-                </a:solidFill>
-                <a:latin typeface="Consolas" panose="020B0609020204030204" pitchFamily="49" charset="0"/>
-              </a:rPr>
-              <a:t>printf</a:t>
-            </a:r>
-            <a:r>
-              <a:rPr lang="en-US" sz="2800" dirty="0">
-                <a:solidFill>
-                  <a:srgbClr val="000000"/>
-                </a:solidFill>
-                <a:latin typeface="Consolas" panose="020B0609020204030204" pitchFamily="49" charset="0"/>
-              </a:rPr>
-              <a:t>(</a:t>
-            </a:r>
-            <a:r>
-              <a:rPr lang="en-US" sz="2800" dirty="0">
-                <a:solidFill>
-                  <a:srgbClr val="A31515"/>
-                </a:solidFill>
-                <a:latin typeface="Consolas" panose="020B0609020204030204" pitchFamily="49" charset="0"/>
-              </a:rPr>
-              <a:t>"a: %d b: %d c: %d"</a:t>
-            </a:r>
-            <a:r>
-              <a:rPr lang="en-US" sz="2800" dirty="0">
-                <a:solidFill>
-                  <a:srgbClr val="000000"/>
-                </a:solidFill>
-                <a:latin typeface="Consolas" panose="020B0609020204030204" pitchFamily="49" charset="0"/>
-              </a:rPr>
-              <a:t>,</a:t>
-            </a:r>
-          </a:p>
-          <a:p>
-            <a:r>
-              <a:rPr lang="en-US" sz="2800" dirty="0">
-                <a:solidFill>
-                  <a:srgbClr val="000000"/>
-                </a:solidFill>
-                <a:latin typeface="Consolas" panose="020B0609020204030204" pitchFamily="49" charset="0"/>
-              </a:rPr>
-              <a:t>        </a:t>
-            </a:r>
-            <a:r>
-              <a:rPr lang="en-US" sz="2800" dirty="0" err="1">
-                <a:solidFill>
-                  <a:srgbClr val="000000"/>
-                </a:solidFill>
-                <a:latin typeface="Consolas" panose="020B0609020204030204" pitchFamily="49" charset="0"/>
-              </a:rPr>
-              <a:t>ex.a</a:t>
-            </a:r>
-            <a:r>
-              <a:rPr lang="en-US" sz="2800" dirty="0">
-                <a:solidFill>
-                  <a:srgbClr val="000000"/>
-                </a:solidFill>
-                <a:latin typeface="Consolas" panose="020B0609020204030204" pitchFamily="49" charset="0"/>
-              </a:rPr>
-              <a:t>, </a:t>
-            </a:r>
-            <a:r>
-              <a:rPr lang="en-US" sz="2800" dirty="0" err="1">
-                <a:solidFill>
-                  <a:srgbClr val="000000"/>
-                </a:solidFill>
-                <a:latin typeface="Consolas" panose="020B0609020204030204" pitchFamily="49" charset="0"/>
-              </a:rPr>
-              <a:t>ex.b</a:t>
-            </a:r>
-            <a:r>
-              <a:rPr lang="en-US" sz="2800" dirty="0">
-                <a:solidFill>
-                  <a:srgbClr val="000000"/>
-                </a:solidFill>
-                <a:latin typeface="Consolas" panose="020B0609020204030204" pitchFamily="49" charset="0"/>
-              </a:rPr>
-              <a:t>, </a:t>
-            </a:r>
-            <a:r>
-              <a:rPr lang="en-US" sz="2800" dirty="0" err="1">
-                <a:solidFill>
-                  <a:srgbClr val="000000"/>
-                </a:solidFill>
-                <a:latin typeface="Consolas" panose="020B0609020204030204" pitchFamily="49" charset="0"/>
-              </a:rPr>
-              <a:t>ex.c</a:t>
-            </a:r>
-            <a:r>
-              <a:rPr lang="en-US" sz="2800" dirty="0">
-                <a:solidFill>
-                  <a:srgbClr val="000000"/>
-                </a:solidFill>
-                <a:latin typeface="Consolas" panose="020B0609020204030204" pitchFamily="49" charset="0"/>
-              </a:rPr>
-              <a:t>);</a:t>
-            </a:r>
-          </a:p>
-          <a:p>
-            <a:r>
-              <a:rPr lang="en-US" sz="2800" dirty="0">
-                <a:solidFill>
-                  <a:srgbClr val="000000"/>
-                </a:solidFill>
-                <a:latin typeface="Consolas" panose="020B0609020204030204" pitchFamily="49" charset="0"/>
-              </a:rPr>
-              <a:t>}</a:t>
-            </a:r>
-            <a:br>
-              <a:rPr lang="en-US" sz="2800" dirty="0">
-                <a:solidFill>
-                  <a:srgbClr val="000000"/>
-                </a:solidFill>
-                <a:latin typeface="Consolas" panose="020B0609020204030204" pitchFamily="49" charset="0"/>
-              </a:rPr>
-            </a:br>
-            <a:endParaRPr lang="en-US" sz="2800" b="0" dirty="0">
-              <a:solidFill>
-                <a:srgbClr val="000000"/>
-              </a:solidFill>
-              <a:effectLst/>
-              <a:latin typeface="Consolas" panose="020B0609020204030204" pitchFamily="49" charset="0"/>
-            </a:endParaRPr>
+              <a:t>auto</a:t>
+            </a:r>
+            <a:r>
+              <a:rPr lang="en-US" sz="4800" dirty="0">
+                <a:solidFill>
+                  <a:srgbClr val="000000"/>
+                </a:solidFill>
+                <a:latin typeface="Consolas" panose="020B0609020204030204" pitchFamily="49" charset="0"/>
+              </a:rPr>
+              <a:t> [a, b, c] = ex;</a:t>
+            </a:r>
+          </a:p>
+        </p:txBody>
+      </p:sp>
+      <p:sp>
+        <p:nvSpPr>
+          <p:cNvPr id="8" name="Callout: Down Arrow 7">
+            <a:extLst>
+              <a:ext uri="{FF2B5EF4-FFF2-40B4-BE49-F238E27FC236}">
+                <a16:creationId xmlns:a16="http://schemas.microsoft.com/office/drawing/2014/main" id="{41817E8E-8C99-41F8-A6B3-2A79ACC66404}"/>
+              </a:ext>
+            </a:extLst>
+          </p:cNvPr>
+          <p:cNvSpPr/>
+          <p:nvPr/>
+        </p:nvSpPr>
+        <p:spPr>
+          <a:xfrm>
+            <a:off x="1820556" y="2163536"/>
+            <a:ext cx="2237093" cy="1265464"/>
+          </a:xfrm>
+          <a:prstGeom prst="downArrowCallout">
+            <a:avLst/>
+          </a:prstGeom>
+        </p:spPr>
+        <p:style>
+          <a:lnRef idx="2">
+            <a:schemeClr val="accent1">
+              <a:shade val="50000"/>
+            </a:schemeClr>
+          </a:lnRef>
+          <a:fillRef idx="1">
+            <a:schemeClr val="accent1"/>
+          </a:fillRef>
+          <a:effectRef idx="0">
+            <a:schemeClr val="accent1"/>
+          </a:effectRef>
+          <a:fontRef idx="minor">
+            <a:schemeClr val="lt1"/>
+          </a:fontRef>
+        </p:style>
+        <p:txBody>
+          <a:bodyPr rtlCol="0" anchor="ctr"/>
+          <a:lstStyle/>
+          <a:p>
+            <a:pPr algn="ctr"/>
+            <a:r>
+              <a:rPr lang="en-US" dirty="0"/>
+              <a:t>Type of unnamed tuple-like object</a:t>
+            </a:r>
+          </a:p>
+        </p:txBody>
+      </p:sp>
+      <p:sp>
+        <p:nvSpPr>
+          <p:cNvPr id="9" name="Callout: Down Arrow 8">
+            <a:extLst>
+              <a:ext uri="{FF2B5EF4-FFF2-40B4-BE49-F238E27FC236}">
+                <a16:creationId xmlns:a16="http://schemas.microsoft.com/office/drawing/2014/main" id="{AAFC38FB-CDA4-4721-8C51-BAE129943C0F}"/>
+              </a:ext>
+            </a:extLst>
+          </p:cNvPr>
+          <p:cNvSpPr/>
+          <p:nvPr/>
+        </p:nvSpPr>
+        <p:spPr>
+          <a:xfrm>
+            <a:off x="4306661" y="2163536"/>
+            <a:ext cx="2592160" cy="1265464"/>
+          </a:xfrm>
+          <a:prstGeom prst="downArrowCallout">
+            <a:avLst/>
+          </a:prstGeom>
+        </p:spPr>
+        <p:style>
+          <a:lnRef idx="2">
+            <a:schemeClr val="accent1">
+              <a:shade val="50000"/>
+            </a:schemeClr>
+          </a:lnRef>
+          <a:fillRef idx="1">
+            <a:schemeClr val="accent1"/>
+          </a:fillRef>
+          <a:effectRef idx="0">
+            <a:schemeClr val="accent1"/>
+          </a:effectRef>
+          <a:fontRef idx="minor">
+            <a:schemeClr val="lt1"/>
+          </a:fontRef>
+        </p:style>
+        <p:txBody>
+          <a:bodyPr rtlCol="0" anchor="ctr"/>
+          <a:lstStyle/>
+          <a:p>
+            <a:pPr algn="ctr"/>
+            <a:r>
+              <a:rPr lang="en-US" dirty="0"/>
+              <a:t>Names of aliases for “members”</a:t>
+            </a:r>
+          </a:p>
+        </p:txBody>
+      </p:sp>
+      <p:sp>
+        <p:nvSpPr>
+          <p:cNvPr id="10" name="Callout: Down Arrow 9">
+            <a:extLst>
+              <a:ext uri="{FF2B5EF4-FFF2-40B4-BE49-F238E27FC236}">
+                <a16:creationId xmlns:a16="http://schemas.microsoft.com/office/drawing/2014/main" id="{20AA6766-AE43-4F5E-A01E-8F3C9F87BAF9}"/>
+              </a:ext>
+            </a:extLst>
+          </p:cNvPr>
+          <p:cNvSpPr/>
+          <p:nvPr/>
+        </p:nvSpPr>
+        <p:spPr>
+          <a:xfrm>
+            <a:off x="7124023" y="2163536"/>
+            <a:ext cx="2592160" cy="1265464"/>
+          </a:xfrm>
+          <a:prstGeom prst="downArrowCallout">
+            <a:avLst/>
+          </a:prstGeom>
+        </p:spPr>
+        <p:style>
+          <a:lnRef idx="2">
+            <a:schemeClr val="accent1">
+              <a:shade val="50000"/>
+            </a:schemeClr>
+          </a:lnRef>
+          <a:fillRef idx="1">
+            <a:schemeClr val="accent1"/>
+          </a:fillRef>
+          <a:effectRef idx="0">
+            <a:schemeClr val="accent1"/>
+          </a:effectRef>
+          <a:fontRef idx="minor">
+            <a:schemeClr val="lt1"/>
+          </a:fontRef>
+        </p:style>
+        <p:txBody>
+          <a:bodyPr rtlCol="0" anchor="ctr"/>
+          <a:lstStyle/>
+          <a:p>
+            <a:pPr algn="ctr"/>
+            <a:r>
+              <a:rPr lang="en-US" dirty="0"/>
+              <a:t>Any initializing expression</a:t>
+            </a:r>
           </a:p>
         </p:txBody>
       </p:sp>
     </p:spTree>
     <p:extLst>
       <p:ext uri="{BB962C8B-B14F-4D97-AF65-F5344CB8AC3E}">
-        <p14:creationId xmlns:p14="http://schemas.microsoft.com/office/powerpoint/2010/main" val="833190232"/>
+        <p14:creationId xmlns:p14="http://schemas.microsoft.com/office/powerpoint/2010/main" val="3451418128"/>
       </p:ext>
     </p:extLst>
   </p:cSld>
@@ -5690,7 +5431,7 @@
           <p:cNvPr id="2" name="Title 1">
             <a:extLst>
               <a:ext uri="{FF2B5EF4-FFF2-40B4-BE49-F238E27FC236}">
-                <a16:creationId xmlns:a16="http://schemas.microsoft.com/office/drawing/2014/main" id="{F8D7EFA3-1ED3-4AEB-851A-131E7EB67CD4}"/>
+                <a16:creationId xmlns:a16="http://schemas.microsoft.com/office/drawing/2014/main" id="{A65A0B7B-890B-4ABF-A96B-4A436A645DA1}"/>
               </a:ext>
             </a:extLst>
           </p:cNvPr>
@@ -5715,10 +5456,10 @@
       </p:sp>
       <p:sp>
         <p:nvSpPr>
-          <p:cNvPr id="3" name="Rectangle 2">
+          <p:cNvPr id="4" name="Rectangle 3">
             <a:extLst>
               <a:ext uri="{FF2B5EF4-FFF2-40B4-BE49-F238E27FC236}">
-                <a16:creationId xmlns:a16="http://schemas.microsoft.com/office/drawing/2014/main" id="{93559E43-8305-439A-A434-ED283D37CAC0}"/>
+                <a16:creationId xmlns:a16="http://schemas.microsoft.com/office/drawing/2014/main" id="{DF3AEFA3-1B1D-4E61-A939-4B968F39A48A}"/>
               </a:ext>
             </a:extLst>
           </p:cNvPr>
@@ -5727,30 +5468,163 @@
         </p:nvSpPr>
         <p:spPr>
           <a:xfrm>
-            <a:off x="1382486" y="1454914"/>
-            <a:ext cx="6096000" cy="4401205"/>
+            <a:off x="923409" y="1325636"/>
+            <a:ext cx="11481800" cy="4524315"/>
           </a:xfrm>
           <a:prstGeom prst="rect">
             <a:avLst/>
           </a:prstGeom>
         </p:spPr>
         <p:txBody>
-          <a:bodyPr>
+          <a:bodyPr wrap="square">
             <a:spAutoFit/>
           </a:bodyPr>
           <a:lstStyle/>
           <a:p>
             <a:r>
-              <a:rPr lang="fr-FR" sz="2800" dirty="0" err="1">
+              <a:rPr lang="en-US">
                 <a:solidFill>
                   <a:srgbClr val="0000FF"/>
                 </a:solidFill>
                 <a:latin typeface="Consolas" panose="020B0609020204030204" pitchFamily="49" charset="0"/>
               </a:rPr>
+              <a:t>#include </a:t>
+            </a:r>
+            <a:r>
+              <a:rPr lang="en-US">
+                <a:solidFill>
+                  <a:srgbClr val="A31515"/>
+                </a:solidFill>
+                <a:latin typeface="Consolas" panose="020B0609020204030204" pitchFamily="49" charset="0"/>
+              </a:rPr>
+              <a:t>&lt;</a:t>
+            </a:r>
+            <a:r>
+              <a:rPr lang="en-US" err="1">
+                <a:solidFill>
+                  <a:srgbClr val="A31515"/>
+                </a:solidFill>
+                <a:latin typeface="Consolas" panose="020B0609020204030204" pitchFamily="49" charset="0"/>
+              </a:rPr>
+              <a:t>ntdef.h</a:t>
+            </a:r>
+            <a:r>
+              <a:rPr lang="en-US">
+                <a:solidFill>
+                  <a:srgbClr val="A31515"/>
+                </a:solidFill>
+                <a:latin typeface="Consolas" panose="020B0609020204030204" pitchFamily="49" charset="0"/>
+              </a:rPr>
+              <a:t>&gt;</a:t>
+            </a:r>
+            <a:endParaRPr lang="en-US">
+              <a:solidFill>
+                <a:srgbClr val="000000"/>
+              </a:solidFill>
+              <a:latin typeface="Consolas" panose="020B0609020204030204" pitchFamily="49" charset="0"/>
+            </a:endParaRPr>
+          </a:p>
+          <a:p>
+            <a:r>
+              <a:rPr lang="en-US">
+                <a:solidFill>
+                  <a:srgbClr val="0000FF"/>
+                </a:solidFill>
+                <a:latin typeface="Consolas" panose="020B0609020204030204" pitchFamily="49" charset="0"/>
+              </a:rPr>
+              <a:t>#include </a:t>
+            </a:r>
+            <a:r>
+              <a:rPr lang="en-US">
+                <a:solidFill>
+                  <a:srgbClr val="A31515"/>
+                </a:solidFill>
+                <a:latin typeface="Consolas" panose="020B0609020204030204" pitchFamily="49" charset="0"/>
+              </a:rPr>
+              <a:t>&lt;</a:t>
+            </a:r>
+            <a:r>
+              <a:rPr lang="en-US" err="1">
+                <a:solidFill>
+                  <a:srgbClr val="A31515"/>
+                </a:solidFill>
+                <a:latin typeface="Consolas" panose="020B0609020204030204" pitchFamily="49" charset="0"/>
+              </a:rPr>
+              <a:t>windows.h</a:t>
+            </a:r>
+            <a:r>
+              <a:rPr lang="en-US">
+                <a:solidFill>
+                  <a:srgbClr val="A31515"/>
+                </a:solidFill>
+                <a:latin typeface="Consolas" panose="020B0609020204030204" pitchFamily="49" charset="0"/>
+              </a:rPr>
+              <a:t>&gt;</a:t>
+            </a:r>
+            <a:endParaRPr lang="en-US">
+              <a:solidFill>
+                <a:srgbClr val="000000"/>
+              </a:solidFill>
+              <a:latin typeface="Consolas" panose="020B0609020204030204" pitchFamily="49" charset="0"/>
+            </a:endParaRPr>
+          </a:p>
+          <a:p>
+            <a:br>
+              <a:rPr lang="en-US">
+                <a:solidFill>
+                  <a:srgbClr val="000000"/>
+                </a:solidFill>
+                <a:latin typeface="Consolas" panose="020B0609020204030204" pitchFamily="49" charset="0"/>
+              </a:rPr>
+            </a:br>
+            <a:r>
+              <a:rPr lang="en-US">
+                <a:solidFill>
+                  <a:srgbClr val="000000"/>
+                </a:solidFill>
+                <a:latin typeface="Consolas" panose="020B0609020204030204" pitchFamily="49" charset="0"/>
+              </a:rPr>
+              <a:t>UNICODE_STRING </a:t>
+            </a:r>
+            <a:r>
+              <a:rPr lang="en-US" err="1">
+                <a:solidFill>
+                  <a:srgbClr val="000000"/>
+                </a:solidFill>
+                <a:latin typeface="Consolas" panose="020B0609020204030204" pitchFamily="49" charset="0"/>
+              </a:rPr>
+              <a:t>get_str</a:t>
+            </a:r>
+            <a:r>
+              <a:rPr lang="en-US">
+                <a:solidFill>
+                  <a:srgbClr val="000000"/>
+                </a:solidFill>
+                <a:latin typeface="Consolas" panose="020B0609020204030204" pitchFamily="49" charset="0"/>
+              </a:rPr>
+              <a:t>();</a:t>
+            </a:r>
+          </a:p>
+          <a:p>
+            <a:br>
+              <a:rPr lang="en-US">
+                <a:solidFill>
+                  <a:srgbClr val="000000"/>
+                </a:solidFill>
+                <a:latin typeface="Consolas" panose="020B0609020204030204" pitchFamily="49" charset="0"/>
+              </a:rPr>
+            </a:br>
+            <a:r>
+              <a:rPr lang="en-US">
+                <a:solidFill>
+                  <a:srgbClr val="0000FF"/>
+                </a:solidFill>
+                <a:latin typeface="Consolas" panose="020B0609020204030204" pitchFamily="49" charset="0"/>
+              </a:rPr>
               <a:t>int</a:t>
             </a:r>
             <a:r>
-              <a:rPr lang="fr-FR" sz="2800" dirty="0">
+              <a:rPr lang="en-US">
                 <a:solidFill>
                   <a:srgbClr val="000000"/>
                 </a:solidFill>
@@ -5761,72 +5635,81 @@
           </a:p>
           <a:p>
             <a:r>
-              <a:rPr lang="fr-FR" sz="2800" dirty="0">
-                <a:solidFill>
-                  <a:srgbClr val="000000"/>
-                </a:solidFill>
-                <a:latin typeface="Consolas" panose="020B0609020204030204" pitchFamily="49" charset="0"/>
-              </a:rPr>
-              <a:t>    </a:t>
-            </a:r>
-            <a:r>
-              <a:rPr lang="fr-FR" sz="2800" dirty="0" err="1">
-                <a:solidFill>
-                  <a:srgbClr val="000000"/>
-                </a:solidFill>
-                <a:latin typeface="Consolas" panose="020B0609020204030204" pitchFamily="49" charset="0"/>
-              </a:rPr>
-              <a:t>example</a:t>
-            </a:r>
-            <a:r>
-              <a:rPr lang="fr-FR" sz="2800" dirty="0">
-                <a:solidFill>
-                  <a:srgbClr val="000000"/>
-                </a:solidFill>
-                <a:latin typeface="Consolas" panose="020B0609020204030204" pitchFamily="49" charset="0"/>
-              </a:rPr>
-              <a:t> ex;</a:t>
-            </a:r>
-          </a:p>
-          <a:p>
-            <a:r>
-              <a:rPr lang="fr-FR" sz="2800" dirty="0">
-                <a:solidFill>
-                  <a:srgbClr val="000000"/>
-                </a:solidFill>
-                <a:latin typeface="Consolas" panose="020B0609020204030204" pitchFamily="49" charset="0"/>
-              </a:rPr>
-              <a:t>    </a:t>
-            </a:r>
-            <a:r>
-              <a:rPr lang="fr-FR" sz="2800" dirty="0" err="1">
-                <a:solidFill>
-                  <a:srgbClr val="000000"/>
-                </a:solidFill>
-                <a:latin typeface="Consolas" panose="020B0609020204030204" pitchFamily="49" charset="0"/>
-              </a:rPr>
-              <a:t>ex.a</a:t>
-            </a:r>
-            <a:r>
-              <a:rPr lang="fr-FR" sz="2800" dirty="0">
-                <a:solidFill>
-                  <a:srgbClr val="000000"/>
-                </a:solidFill>
-                <a:latin typeface="Consolas" panose="020B0609020204030204" pitchFamily="49" charset="0"/>
-              </a:rPr>
-              <a:t> = </a:t>
-            </a:r>
-            <a:r>
-              <a:rPr lang="fr-FR" sz="2800" dirty="0">
-                <a:solidFill>
-                  <a:srgbClr val="09885A"/>
-                </a:solidFill>
-                <a:latin typeface="Consolas" panose="020B0609020204030204" pitchFamily="49" charset="0"/>
-              </a:rPr>
-              <a:t>42</a:t>
-            </a:r>
-            <a:r>
-              <a:rPr lang="fr-FR" sz="2800" dirty="0">
+              <a:rPr lang="en-US">
+                <a:solidFill>
+                  <a:srgbClr val="0000FF"/>
+                </a:solidFill>
+                <a:latin typeface="Consolas" panose="020B0609020204030204" pitchFamily="49" charset="0"/>
+              </a:rPr>
+              <a:t>    auto</a:t>
+            </a:r>
+            <a:r>
+              <a:rPr lang="en-US">
+                <a:solidFill>
+                  <a:srgbClr val="000000"/>
+                </a:solidFill>
+                <a:latin typeface="Consolas" panose="020B0609020204030204" pitchFamily="49" charset="0"/>
+              </a:rPr>
+              <a:t> [Length, </a:t>
+            </a:r>
+            <a:r>
+              <a:rPr lang="en-US" err="1">
+                <a:solidFill>
+                  <a:srgbClr val="000000"/>
+                </a:solidFill>
+                <a:latin typeface="Consolas" panose="020B0609020204030204" pitchFamily="49" charset="0"/>
+              </a:rPr>
+              <a:t>MaxLength</a:t>
+            </a:r>
+            <a:r>
+              <a:rPr lang="en-US">
+                <a:solidFill>
+                  <a:srgbClr val="000000"/>
+                </a:solidFill>
+                <a:latin typeface="Consolas" panose="020B0609020204030204" pitchFamily="49" charset="0"/>
+              </a:rPr>
+              <a:t>, Buffer] = </a:t>
+            </a:r>
+            <a:r>
+              <a:rPr lang="en-US" err="1">
+                <a:solidFill>
+                  <a:srgbClr val="000000"/>
+                </a:solidFill>
+                <a:latin typeface="Consolas" panose="020B0609020204030204" pitchFamily="49" charset="0"/>
+              </a:rPr>
+              <a:t>get_str</a:t>
+            </a:r>
+            <a:r>
+              <a:rPr lang="en-US">
+                <a:solidFill>
+                  <a:srgbClr val="000000"/>
+                </a:solidFill>
+                <a:latin typeface="Consolas" panose="020B0609020204030204" pitchFamily="49" charset="0"/>
+              </a:rPr>
+              <a:t>();</a:t>
+            </a:r>
+          </a:p>
+          <a:p>
+            <a:r>
+              <a:rPr lang="en-US">
+                <a:solidFill>
+                  <a:srgbClr val="000000"/>
+                </a:solidFill>
+                <a:latin typeface="Consolas" panose="020B0609020204030204" pitchFamily="49" charset="0"/>
+              </a:rPr>
+              <a:t>    DWORD </a:t>
+            </a:r>
+            <a:r>
+              <a:rPr lang="en-US" err="1">
+                <a:solidFill>
+                  <a:srgbClr val="000000"/>
+                </a:solidFill>
+                <a:latin typeface="Consolas" panose="020B0609020204030204" pitchFamily="49" charset="0"/>
+              </a:rPr>
+              <a:t>charsWritten</a:t>
+            </a:r>
+            <a:r>
+              <a:rPr lang="en-US">
                 <a:solidFill>
                   <a:srgbClr val="000000"/>
                 </a:solidFill>
@@ -5837,156 +5720,185 @@
           </a:p>
           <a:p>
             <a:r>
-              <a:rPr lang="fr-FR" sz="2800" dirty="0">
-                <a:solidFill>
-                  <a:srgbClr val="000000"/>
-                </a:solidFill>
-                <a:latin typeface="Consolas" panose="020B0609020204030204" pitchFamily="49" charset="0"/>
-              </a:rPr>
-              <a:t>    </a:t>
-            </a:r>
-            <a:r>
-              <a:rPr lang="fr-FR" sz="2800" dirty="0" err="1">
-                <a:solidFill>
-                  <a:srgbClr val="000000"/>
-                </a:solidFill>
-                <a:latin typeface="Consolas" panose="020B0609020204030204" pitchFamily="49" charset="0"/>
-              </a:rPr>
-              <a:t>ex.b</a:t>
-            </a:r>
-            <a:r>
-              <a:rPr lang="fr-FR" sz="2800" dirty="0">
-                <a:solidFill>
-                  <a:srgbClr val="000000"/>
-                </a:solidFill>
-                <a:latin typeface="Consolas" panose="020B0609020204030204" pitchFamily="49" charset="0"/>
-              </a:rPr>
-              <a:t> = </a:t>
-            </a:r>
-            <a:r>
-              <a:rPr lang="fr-FR" sz="2800" dirty="0">
-                <a:solidFill>
-                  <a:srgbClr val="09885A"/>
-                </a:solidFill>
-                <a:latin typeface="Consolas" panose="020B0609020204030204" pitchFamily="49" charset="0"/>
-              </a:rPr>
-              <a:t>1234</a:t>
-            </a:r>
-            <a:r>
-              <a:rPr lang="fr-FR" sz="2800" dirty="0">
-                <a:solidFill>
-                  <a:srgbClr val="000000"/>
-                </a:solidFill>
-                <a:latin typeface="Consolas" panose="020B0609020204030204" pitchFamily="49" charset="0"/>
-              </a:rPr>
-              <a:t>;</a:t>
-            </a:r>
-          </a:p>
-          <a:p>
-            <a:r>
-              <a:rPr lang="fr-FR" sz="2800" dirty="0">
-                <a:solidFill>
-                  <a:srgbClr val="000000"/>
-                </a:solidFill>
-                <a:latin typeface="Consolas" panose="020B0609020204030204" pitchFamily="49" charset="0"/>
-              </a:rPr>
-              <a:t>    </a:t>
-            </a:r>
-            <a:r>
-              <a:rPr lang="fr-FR" sz="2800" dirty="0" err="1">
-                <a:solidFill>
-                  <a:srgbClr val="000000"/>
-                </a:solidFill>
-                <a:latin typeface="Consolas" panose="020B0609020204030204" pitchFamily="49" charset="0"/>
-              </a:rPr>
-              <a:t>ex.c</a:t>
-            </a:r>
-            <a:r>
-              <a:rPr lang="fr-FR" sz="2800" dirty="0">
-                <a:solidFill>
-                  <a:srgbClr val="000000"/>
-                </a:solidFill>
-                <a:latin typeface="Consolas" panose="020B0609020204030204" pitchFamily="49" charset="0"/>
-              </a:rPr>
-              <a:t> = </a:t>
-            </a:r>
-            <a:r>
-              <a:rPr lang="fr-FR" sz="2800" dirty="0">
-                <a:solidFill>
-                  <a:srgbClr val="09885A"/>
-                </a:solidFill>
-                <a:latin typeface="Consolas" panose="020B0609020204030204" pitchFamily="49" charset="0"/>
-              </a:rPr>
-              <a:t>1729</a:t>
-            </a:r>
-            <a:r>
-              <a:rPr lang="fr-FR" sz="2800" dirty="0">
-                <a:solidFill>
-                  <a:srgbClr val="000000"/>
-                </a:solidFill>
-                <a:latin typeface="Consolas" panose="020B0609020204030204" pitchFamily="49" charset="0"/>
-              </a:rPr>
-              <a:t>;</a:t>
+              <a:rPr lang="en-US">
+                <a:solidFill>
+                  <a:srgbClr val="0000FF"/>
+                </a:solidFill>
+                <a:latin typeface="Consolas" panose="020B0609020204030204" pitchFamily="49" charset="0"/>
+              </a:rPr>
+              <a:t>    if</a:t>
+            </a:r>
+            <a:r>
+              <a:rPr lang="en-US">
+                <a:solidFill>
+                  <a:srgbClr val="000000"/>
+                </a:solidFill>
+                <a:latin typeface="Consolas" panose="020B0609020204030204" pitchFamily="49" charset="0"/>
+              </a:rPr>
+              <a:t> (!</a:t>
+            </a:r>
+            <a:r>
+              <a:rPr lang="en-US" err="1">
+                <a:solidFill>
+                  <a:srgbClr val="000000"/>
+                </a:solidFill>
+                <a:latin typeface="Consolas" panose="020B0609020204030204" pitchFamily="49" charset="0"/>
+              </a:rPr>
+              <a:t>WriteConsoleW</a:t>
+            </a:r>
+            <a:r>
+              <a:rPr lang="en-US">
+                <a:solidFill>
+                  <a:srgbClr val="000000"/>
+                </a:solidFill>
+                <a:latin typeface="Consolas" panose="020B0609020204030204" pitchFamily="49" charset="0"/>
+              </a:rPr>
+              <a:t>(</a:t>
+            </a:r>
+            <a:r>
+              <a:rPr lang="en-US" err="1">
+                <a:solidFill>
+                  <a:srgbClr val="000000"/>
+                </a:solidFill>
+                <a:latin typeface="Consolas" panose="020B0609020204030204" pitchFamily="49" charset="0"/>
+              </a:rPr>
+              <a:t>GetStdHandle</a:t>
+            </a:r>
+            <a:r>
+              <a:rPr lang="en-US">
+                <a:solidFill>
+                  <a:srgbClr val="000000"/>
+                </a:solidFill>
+                <a:latin typeface="Consolas" panose="020B0609020204030204" pitchFamily="49" charset="0"/>
+              </a:rPr>
+              <a:t>(STD_OUTPUT_HANDLE),</a:t>
+            </a:r>
+          </a:p>
+          <a:p>
+            <a:r>
+              <a:rPr lang="en-US">
+                <a:solidFill>
+                  <a:srgbClr val="000000"/>
+                </a:solidFill>
+                <a:latin typeface="Consolas" panose="020B0609020204030204" pitchFamily="49" charset="0"/>
+              </a:rPr>
+              <a:t>             Buffer, Length, &amp;</a:t>
+            </a:r>
+            <a:r>
+              <a:rPr lang="en-US" err="1">
+                <a:solidFill>
+                  <a:srgbClr val="000000"/>
+                </a:solidFill>
+                <a:latin typeface="Consolas" panose="020B0609020204030204" pitchFamily="49" charset="0"/>
+              </a:rPr>
+              <a:t>charsWritten</a:t>
+            </a:r>
+            <a:r>
+              <a:rPr lang="en-US">
+                <a:solidFill>
+                  <a:srgbClr val="000000"/>
+                </a:solidFill>
+                <a:latin typeface="Consolas" panose="020B0609020204030204" pitchFamily="49" charset="0"/>
+              </a:rPr>
+              <a:t>, </a:t>
+            </a:r>
+            <a:r>
+              <a:rPr lang="en-US" err="1">
+                <a:solidFill>
+                  <a:srgbClr val="0000FF"/>
+                </a:solidFill>
+                <a:latin typeface="Consolas" panose="020B0609020204030204" pitchFamily="49" charset="0"/>
+              </a:rPr>
+              <a:t>nullptr</a:t>
+            </a:r>
+            <a:r>
+              <a:rPr lang="en-US">
+                <a:solidFill>
+                  <a:srgbClr val="000000"/>
+                </a:solidFill>
+                <a:latin typeface="Consolas" panose="020B0609020204030204" pitchFamily="49" charset="0"/>
+              </a:rPr>
+              <a:t>)</a:t>
+            </a:r>
+          </a:p>
+          <a:p>
+            <a:r>
+              <a:rPr lang="en-US">
+                <a:solidFill>
+                  <a:srgbClr val="000000"/>
+                </a:solidFill>
+                <a:latin typeface="Consolas" panose="020B0609020204030204" pitchFamily="49" charset="0"/>
+              </a:rPr>
+              <a:t>        || </a:t>
+            </a:r>
+            <a:r>
+              <a:rPr lang="en-US" err="1">
+                <a:solidFill>
+                  <a:srgbClr val="000000"/>
+                </a:solidFill>
+                <a:latin typeface="Consolas" panose="020B0609020204030204" pitchFamily="49" charset="0"/>
+              </a:rPr>
+              <a:t>charsWritten</a:t>
+            </a:r>
+            <a:r>
+              <a:rPr lang="en-US">
+                <a:solidFill>
+                  <a:srgbClr val="000000"/>
+                </a:solidFill>
+                <a:latin typeface="Consolas" panose="020B0609020204030204" pitchFamily="49" charset="0"/>
+              </a:rPr>
+              <a:t> != Length) {</a:t>
+            </a:r>
+          </a:p>
+          <a:p>
+            <a:r>
+              <a:rPr lang="en-US">
+                <a:solidFill>
+                  <a:srgbClr val="008000"/>
+                </a:solidFill>
+                <a:latin typeface="Consolas" panose="020B0609020204030204" pitchFamily="49" charset="0"/>
+              </a:rPr>
+              <a:t>        // Writing that failed for some reason</a:t>
+            </a:r>
+            <a:endParaRPr lang="en-US">
+              <a:solidFill>
+                <a:srgbClr val="000000"/>
+              </a:solidFill>
+              <a:latin typeface="Consolas" panose="020B0609020204030204" pitchFamily="49" charset="0"/>
+            </a:endParaRPr>
+          </a:p>
+          <a:p>
+            <a:r>
+              <a:rPr lang="en-US">
+                <a:solidFill>
+                  <a:srgbClr val="000000"/>
+                </a:solidFill>
+                <a:latin typeface="Consolas" panose="020B0609020204030204" pitchFamily="49" charset="0"/>
+              </a:rPr>
+              <a:t>    }</a:t>
+            </a:r>
+          </a:p>
+          <a:p>
+            <a:r>
+              <a:rPr lang="en-US">
+                <a:solidFill>
+                  <a:srgbClr val="000000"/>
+                </a:solidFill>
+                <a:latin typeface="Consolas" panose="020B0609020204030204" pitchFamily="49" charset="0"/>
+              </a:rPr>
+              <a:t>}</a:t>
             </a:r>
           </a:p>
           <a:p>
             <a:br>
-              <a:rPr lang="fr-FR" sz="2800" dirty="0">
+              <a:rPr lang="en-US">
                 <a:solidFill>
                   <a:srgbClr val="000000"/>
                 </a:solidFill>
                 <a:latin typeface="Consolas" panose="020B0609020204030204" pitchFamily="49" charset="0"/>
               </a:rPr>
             </a:br>
-            <a:r>
-              <a:rPr lang="fr-FR" sz="2800" dirty="0">
-                <a:solidFill>
-                  <a:srgbClr val="000000"/>
-                </a:solidFill>
-                <a:latin typeface="Consolas" panose="020B0609020204030204" pitchFamily="49" charset="0"/>
-              </a:rPr>
-              <a:t>    </a:t>
-            </a:r>
-            <a:r>
-              <a:rPr lang="fr-FR" sz="2800" dirty="0" err="1">
-                <a:solidFill>
-                  <a:srgbClr val="000000"/>
-                </a:solidFill>
-                <a:latin typeface="Consolas" panose="020B0609020204030204" pitchFamily="49" charset="0"/>
-              </a:rPr>
-              <a:t>print_example</a:t>
-            </a:r>
-            <a:r>
-              <a:rPr lang="fr-FR" sz="2800" dirty="0">
-                <a:solidFill>
-                  <a:srgbClr val="000000"/>
-                </a:solidFill>
-                <a:latin typeface="Consolas" panose="020B0609020204030204" pitchFamily="49" charset="0"/>
-              </a:rPr>
-              <a:t>(ex);</a:t>
-            </a:r>
-          </a:p>
-          <a:p>
-            <a:r>
-              <a:rPr lang="fr-FR" sz="2800" dirty="0">
-                <a:solidFill>
-                  <a:srgbClr val="000000"/>
-                </a:solidFill>
-                <a:latin typeface="Consolas" panose="020B0609020204030204" pitchFamily="49" charset="0"/>
-              </a:rPr>
-              <a:t>}</a:t>
-            </a:r>
-          </a:p>
-          <a:p>
-            <a:br>
-              <a:rPr lang="fr-FR" sz="2800" dirty="0">
-                <a:solidFill>
-                  <a:srgbClr val="000000"/>
-                </a:solidFill>
-                <a:latin typeface="Consolas" panose="020B0609020204030204" pitchFamily="49" charset="0"/>
-              </a:rPr>
-            </a:br>
-            <a:endParaRPr lang="fr-FR" sz="2800" b="0" dirty="0">
+            <a:endParaRPr lang="en-US" b="0">
               <a:solidFill>
                 <a:srgbClr val="000000"/>
               </a:solidFill>
@@ -5999,7 +5911,7 @@
     </p:spTree>
     <p:extLst>
       <p:ext uri="{BB962C8B-B14F-4D97-AF65-F5344CB8AC3E}">
-        <p14:creationId xmlns:p14="http://schemas.microsoft.com/office/powerpoint/2010/main" val="87214564"/>
+        <p14:creationId xmlns:p14="http://schemas.microsoft.com/office/powerpoint/2010/main" val="937919153"/>
       </p:ext>
     </p:extLst>
   </p:cSld>
@@ -6056,10 +5968,10 @@
       </p:sp>
       <p:sp>
         <p:nvSpPr>
-          <p:cNvPr id="3" name="Rectangle 2">
+          <p:cNvPr id="4" name="Rectangle 3">
             <a:extLst>
               <a:ext uri="{FF2B5EF4-FFF2-40B4-BE49-F238E27FC236}">
-                <a16:creationId xmlns:a16="http://schemas.microsoft.com/office/drawing/2014/main" id="{93559E43-8305-439A-A434-ED283D37CAC0}"/>
+                <a16:creationId xmlns:a16="http://schemas.microsoft.com/office/drawing/2014/main" id="{631D22A9-70E6-4721-B9D4-C5C29BEECFC0}"/>
               </a:ext>
             </a:extLst>
           </p:cNvPr>
@@ -6068,8 +5980,8 @@
         </p:nvSpPr>
         <p:spPr>
           <a:xfrm>
-            <a:off x="782411" y="1467160"/>
-            <a:ext cx="4626428" cy="4401205"/>
+            <a:off x="638175" y="1279114"/>
+            <a:ext cx="10375446" cy="5693866"/>
           </a:xfrm>
           <a:prstGeom prst="rect">
             <a:avLst/>
@@ -6082,27 +5994,214 @@
           <a:lstStyle/>
           <a:p>
             <a:r>
-              <a:rPr lang="fr-FR" sz="2800" dirty="0" err="1">
+              <a:rPr lang="en-US" sz="2800" dirty="0">
                 <a:solidFill>
                   <a:srgbClr val="0000FF"/>
                 </a:solidFill>
                 <a:latin typeface="Consolas" panose="020B0609020204030204" pitchFamily="49" charset="0"/>
               </a:rPr>
-              <a:t>int</a:t>
-            </a:r>
-            <a:r>
-              <a:rPr lang="fr-FR" sz="2800" dirty="0">
-                <a:solidFill>
-                  <a:srgbClr val="000000"/>
-                </a:solidFill>
-                <a:latin typeface="Consolas" panose="020B0609020204030204" pitchFamily="49" charset="0"/>
-              </a:rPr>
-              <a:t> main() {</a:t>
-            </a:r>
-          </a:p>
-          <a:p>
-            <a:r>
-              <a:rPr lang="fr-FR" sz="2800" dirty="0">
+              <a:t>#include </a:t>
+            </a:r>
+            <a:r>
+              <a:rPr lang="en-US" sz="2800" dirty="0">
+                <a:solidFill>
+                  <a:srgbClr val="A31515"/>
+                </a:solidFill>
+                <a:latin typeface="Consolas" panose="020B0609020204030204" pitchFamily="49" charset="0"/>
+              </a:rPr>
+              <a:t>&lt;</a:t>
+            </a:r>
+            <a:r>
+              <a:rPr lang="en-US" sz="2800" dirty="0" err="1">
+                <a:solidFill>
+                  <a:srgbClr val="A31515"/>
+                </a:solidFill>
+                <a:latin typeface="Consolas" panose="020B0609020204030204" pitchFamily="49" charset="0"/>
+              </a:rPr>
+              <a:t>stdio.h</a:t>
+            </a:r>
+            <a:r>
+              <a:rPr lang="en-US" sz="2800" dirty="0">
+                <a:solidFill>
+                  <a:srgbClr val="A31515"/>
+                </a:solidFill>
+                <a:latin typeface="Consolas" panose="020B0609020204030204" pitchFamily="49" charset="0"/>
+              </a:rPr>
+              <a:t>&gt;</a:t>
+            </a:r>
+            <a:endParaRPr lang="en-US" sz="2800" dirty="0">
+              <a:solidFill>
+                <a:srgbClr val="000000"/>
+              </a:solidFill>
+              <a:latin typeface="Consolas" panose="020B0609020204030204" pitchFamily="49" charset="0"/>
+            </a:endParaRPr>
+          </a:p>
+          <a:p>
+            <a:br>
+              <a:rPr lang="en-US" sz="2800" dirty="0">
+                <a:solidFill>
+                  <a:srgbClr val="000000"/>
+                </a:solidFill>
+                <a:latin typeface="Consolas" panose="020B0609020204030204" pitchFamily="49" charset="0"/>
+              </a:rPr>
+            </a:br>
+            <a:r>
+              <a:rPr lang="en-US" sz="2800" dirty="0">
+                <a:solidFill>
+                  <a:srgbClr val="0000FF"/>
+                </a:solidFill>
+                <a:latin typeface="Consolas" panose="020B0609020204030204" pitchFamily="49" charset="0"/>
+              </a:rPr>
+              <a:t>struct</a:t>
+            </a:r>
+            <a:r>
+              <a:rPr lang="en-US" sz="2800" dirty="0">
+                <a:solidFill>
+                  <a:srgbClr val="000000"/>
+                </a:solidFill>
+                <a:latin typeface="Consolas" panose="020B0609020204030204" pitchFamily="49" charset="0"/>
+              </a:rPr>
+              <a:t> example {</a:t>
+            </a:r>
+          </a:p>
+          <a:p>
+            <a:r>
+              <a:rPr lang="en-US" sz="2800" dirty="0">
+                <a:solidFill>
+                  <a:srgbClr val="0000FF"/>
+                </a:solidFill>
+                <a:latin typeface="Consolas" panose="020B0609020204030204" pitchFamily="49" charset="0"/>
+              </a:rPr>
+              <a:t>    int</a:t>
+            </a:r>
+            <a:r>
+              <a:rPr lang="en-US" sz="2800" dirty="0">
+                <a:solidFill>
+                  <a:srgbClr val="000000"/>
+                </a:solidFill>
+                <a:latin typeface="Consolas" panose="020B0609020204030204" pitchFamily="49" charset="0"/>
+              </a:rPr>
+              <a:t> a;</a:t>
+            </a:r>
+          </a:p>
+          <a:p>
+            <a:r>
+              <a:rPr lang="en-US" sz="2800" dirty="0">
+                <a:solidFill>
+                  <a:srgbClr val="0000FF"/>
+                </a:solidFill>
+                <a:latin typeface="Consolas" panose="020B0609020204030204" pitchFamily="49" charset="0"/>
+              </a:rPr>
+              <a:t>    int</a:t>
+            </a:r>
+            <a:r>
+              <a:rPr lang="en-US" sz="2800" dirty="0">
+                <a:solidFill>
+                  <a:srgbClr val="000000"/>
+                </a:solidFill>
+                <a:latin typeface="Consolas" panose="020B0609020204030204" pitchFamily="49" charset="0"/>
+              </a:rPr>
+              <a:t> b;</a:t>
+            </a:r>
+          </a:p>
+          <a:p>
+            <a:r>
+              <a:rPr lang="en-US" sz="2800" dirty="0">
+                <a:solidFill>
+                  <a:srgbClr val="0000FF"/>
+                </a:solidFill>
+                <a:latin typeface="Consolas" panose="020B0609020204030204" pitchFamily="49" charset="0"/>
+              </a:rPr>
+              <a:t>    int</a:t>
+            </a:r>
+            <a:r>
+              <a:rPr lang="en-US" sz="2800" dirty="0">
+                <a:solidFill>
+                  <a:srgbClr val="000000"/>
+                </a:solidFill>
+                <a:latin typeface="Consolas" panose="020B0609020204030204" pitchFamily="49" charset="0"/>
+              </a:rPr>
+              <a:t> c;</a:t>
+            </a:r>
+          </a:p>
+          <a:p>
+            <a:r>
+              <a:rPr lang="en-US" sz="2800" dirty="0">
+                <a:solidFill>
+                  <a:srgbClr val="000000"/>
+                </a:solidFill>
+                <a:latin typeface="Consolas" panose="020B0609020204030204" pitchFamily="49" charset="0"/>
+              </a:rPr>
+              <a:t>};</a:t>
+            </a:r>
+          </a:p>
+          <a:p>
+            <a:br>
+              <a:rPr lang="en-US" sz="2800" dirty="0">
+                <a:solidFill>
+                  <a:srgbClr val="000000"/>
+                </a:solidFill>
+                <a:latin typeface="Consolas" panose="020B0609020204030204" pitchFamily="49" charset="0"/>
+              </a:rPr>
+            </a:br>
+            <a:r>
+              <a:rPr lang="en-US" sz="2800" dirty="0">
+                <a:solidFill>
+                  <a:srgbClr val="0000FF"/>
+                </a:solidFill>
+                <a:latin typeface="Consolas" panose="020B0609020204030204" pitchFamily="49" charset="0"/>
+              </a:rPr>
+              <a:t>void</a:t>
+            </a:r>
+            <a:r>
+              <a:rPr lang="en-US" sz="2800" dirty="0">
+                <a:solidFill>
+                  <a:srgbClr val="000000"/>
+                </a:solidFill>
+                <a:latin typeface="Consolas" panose="020B0609020204030204" pitchFamily="49" charset="0"/>
+              </a:rPr>
+              <a:t> </a:t>
+            </a:r>
+            <a:r>
+              <a:rPr lang="en-US" sz="2800" dirty="0" err="1">
+                <a:solidFill>
+                  <a:srgbClr val="000000"/>
+                </a:solidFill>
+                <a:latin typeface="Consolas" panose="020B0609020204030204" pitchFamily="49" charset="0"/>
+              </a:rPr>
+              <a:t>print_example</a:t>
+            </a:r>
+            <a:r>
+              <a:rPr lang="en-US" sz="2800" dirty="0">
+                <a:solidFill>
+                  <a:srgbClr val="000000"/>
+                </a:solidFill>
+                <a:latin typeface="Consolas" panose="020B0609020204030204" pitchFamily="49" charset="0"/>
+              </a:rPr>
+              <a:t>(</a:t>
+            </a:r>
+            <a:r>
+              <a:rPr lang="en-US" sz="2800" dirty="0">
+                <a:solidFill>
+                  <a:srgbClr val="0000FF"/>
+                </a:solidFill>
+                <a:latin typeface="Consolas" panose="020B0609020204030204" pitchFamily="49" charset="0"/>
+              </a:rPr>
+              <a:t>const</a:t>
+            </a:r>
+            <a:r>
+              <a:rPr lang="en-US" sz="2800" dirty="0">
+                <a:solidFill>
+                  <a:srgbClr val="000000"/>
+                </a:solidFill>
+                <a:latin typeface="Consolas" panose="020B0609020204030204" pitchFamily="49" charset="0"/>
+              </a:rPr>
+              <a:t> example&amp; ex) {</a:t>
+            </a:r>
+          </a:p>
+          <a:p>
+            <a:r>
+              <a:rPr lang="en-US" sz="2800" dirty="0">
                 <a:solidFill>
                   <a:srgbClr val="000000"/>
                 </a:solidFill>
@@ -6111,36 +6210,54 @@
               <a:t>    </a:t>
             </a:r>
             <a:r>
-              <a:rPr lang="fr-FR" sz="2800" dirty="0" err="1">
-                <a:solidFill>
-                  <a:srgbClr val="000000"/>
-                </a:solidFill>
-                <a:latin typeface="Consolas" panose="020B0609020204030204" pitchFamily="49" charset="0"/>
-              </a:rPr>
-              <a:t>example</a:t>
-            </a:r>
-            <a:r>
-              <a:rPr lang="fr-FR" sz="2800" dirty="0">
-                <a:solidFill>
-                  <a:srgbClr val="000000"/>
-                </a:solidFill>
-                <a:latin typeface="Consolas" panose="020B0609020204030204" pitchFamily="49" charset="0"/>
-              </a:rPr>
-              <a:t> ex;</a:t>
-            </a:r>
-          </a:p>
-          <a:p>
-            <a:r>
-              <a:rPr lang="fr-FR" sz="2800" dirty="0">
-                <a:solidFill>
-                  <a:srgbClr val="000000"/>
-                </a:solidFill>
-                <a:latin typeface="Consolas" panose="020B0609020204030204" pitchFamily="49" charset="0"/>
-              </a:rPr>
-              <a:t>    </a:t>
-            </a:r>
-            <a:r>
-              <a:rPr lang="fr-FR" sz="2800" dirty="0" err="1">
+              <a:rPr lang="en-US" sz="2800" dirty="0" err="1">
+                <a:solidFill>
+                  <a:srgbClr val="000000"/>
+                </a:solidFill>
+                <a:latin typeface="Consolas" panose="020B0609020204030204" pitchFamily="49" charset="0"/>
+              </a:rPr>
+              <a:t>printf</a:t>
+            </a:r>
+            <a:r>
+              <a:rPr lang="en-US" sz="2800" dirty="0">
+                <a:solidFill>
+                  <a:srgbClr val="000000"/>
+                </a:solidFill>
+                <a:latin typeface="Consolas" panose="020B0609020204030204" pitchFamily="49" charset="0"/>
+              </a:rPr>
+              <a:t>(</a:t>
+            </a:r>
+            <a:r>
+              <a:rPr lang="en-US" sz="2800" dirty="0">
+                <a:solidFill>
+                  <a:srgbClr val="A31515"/>
+                </a:solidFill>
+                <a:latin typeface="Consolas" panose="020B0609020204030204" pitchFamily="49" charset="0"/>
+              </a:rPr>
+              <a:t>"a: %d b: %d c: %d"</a:t>
+            </a:r>
+            <a:r>
+              <a:rPr lang="en-US" sz="2800" dirty="0">
+                <a:solidFill>
+                  <a:srgbClr val="000000"/>
+                </a:solidFill>
+                <a:latin typeface="Consolas" panose="020B0609020204030204" pitchFamily="49" charset="0"/>
+              </a:rPr>
+              <a:t>,</a:t>
+            </a:r>
+          </a:p>
+          <a:p>
+            <a:r>
+              <a:rPr lang="en-US" sz="2800" dirty="0">
+                <a:solidFill>
+                  <a:srgbClr val="000000"/>
+                </a:solidFill>
+                <a:latin typeface="Consolas" panose="020B0609020204030204" pitchFamily="49" charset="0"/>
+              </a:rPr>
+              <a:t>        </a:t>
+            </a:r>
+            <a:r>
+              <a:rPr lang="en-US" sz="2800" dirty="0" err="1">
                 <a:solidFill>
                   <a:srgbClr val="000000"/>
                 </a:solidFill>
@@ -6149,45 +6266,16 @@
               <a:t>ex.a</a:t>
             </a:r>
             <a:r>
-              <a:rPr lang="fr-FR" sz="2800" dirty="0">
-                <a:solidFill>
-                  <a:srgbClr val="000000"/>
-                </a:solidFill>
-                <a:latin typeface="Consolas" panose="020B0609020204030204" pitchFamily="49" charset="0"/>
-              </a:rPr>
-              <a:t> = </a:t>
-            </a:r>
-            <a:r>
-              <a:rPr lang="fr-FR" sz="2800" dirty="0">
-                <a:solidFill>
-                  <a:srgbClr val="09885A"/>
-                </a:solidFill>
-                <a:latin typeface="Consolas" panose="020B0609020204030204" pitchFamily="49" charset="0"/>
-              </a:rPr>
-              <a:t>42</a:t>
-            </a:r>
-            <a:r>
-              <a:rPr lang="fr-FR" sz="2800" dirty="0">
-                <a:solidFill>
-                  <a:srgbClr val="000000"/>
-                </a:solidFill>
-                <a:latin typeface="Consolas" panose="020B0609020204030204" pitchFamily="49" charset="0"/>
-              </a:rPr>
-              <a:t>;</a:t>
-            </a:r>
-          </a:p>
-          <a:p>
-            <a:r>
-              <a:rPr lang="fr-FR" sz="2800" dirty="0">
-                <a:solidFill>
-                  <a:srgbClr val="000000"/>
-                </a:solidFill>
-                <a:latin typeface="Consolas" panose="020B0609020204030204" pitchFamily="49" charset="0"/>
-              </a:rPr>
-              <a:t>    </a:t>
-            </a:r>
-            <a:r>
-              <a:rPr lang="fr-FR" sz="2800" dirty="0" err="1">
+              <a:rPr lang="en-US" sz="2800" dirty="0">
+                <a:solidFill>
+                  <a:srgbClr val="000000"/>
+                </a:solidFill>
+                <a:latin typeface="Consolas" panose="020B0609020204030204" pitchFamily="49" charset="0"/>
+              </a:rPr>
+              <a:t>, </a:t>
+            </a:r>
+            <a:r>
+              <a:rPr lang="en-US" sz="2800" dirty="0" err="1">
                 <a:solidFill>
                   <a:srgbClr val="000000"/>
                 </a:solidFill>
@@ -6196,45 +6284,16 @@
               <a:t>ex.b</a:t>
             </a:r>
             <a:r>
-              <a:rPr lang="fr-FR" sz="2800" dirty="0">
-                <a:solidFill>
-                  <a:srgbClr val="000000"/>
-                </a:solidFill>
-                <a:latin typeface="Consolas" panose="020B0609020204030204" pitchFamily="49" charset="0"/>
-              </a:rPr>
-              <a:t> = </a:t>
-            </a:r>
-            <a:r>
-              <a:rPr lang="fr-FR" sz="2800" dirty="0">
-                <a:solidFill>
-                  <a:srgbClr val="09885A"/>
-                </a:solidFill>
-                <a:latin typeface="Consolas" panose="020B0609020204030204" pitchFamily="49" charset="0"/>
-              </a:rPr>
-              <a:t>1234</a:t>
-            </a:r>
-            <a:r>
-              <a:rPr lang="fr-FR" sz="2800" dirty="0">
-                <a:solidFill>
-                  <a:srgbClr val="000000"/>
-                </a:solidFill>
-                <a:latin typeface="Consolas" panose="020B0609020204030204" pitchFamily="49" charset="0"/>
-              </a:rPr>
-              <a:t>;</a:t>
-            </a:r>
-          </a:p>
-          <a:p>
-            <a:r>
-              <a:rPr lang="fr-FR" sz="2800" dirty="0">
-                <a:solidFill>
-                  <a:srgbClr val="000000"/>
-                </a:solidFill>
-                <a:latin typeface="Consolas" panose="020B0609020204030204" pitchFamily="49" charset="0"/>
-              </a:rPr>
-              <a:t>    </a:t>
-            </a:r>
-            <a:r>
-              <a:rPr lang="fr-FR" sz="2800" dirty="0" err="1">
+              <a:rPr lang="en-US" sz="2800" dirty="0">
+                <a:solidFill>
+                  <a:srgbClr val="000000"/>
+                </a:solidFill>
+                <a:latin typeface="Consolas" panose="020B0609020204030204" pitchFamily="49" charset="0"/>
+              </a:rPr>
+              <a:t>, </a:t>
+            </a:r>
+            <a:r>
+              <a:rPr lang="en-US" sz="2800" dirty="0" err="1">
                 <a:solidFill>
                   <a:srgbClr val="000000"/>
                 </a:solidFill>
@@ -6243,91 +6302,34 @@
               <a:t>ex.c</a:t>
             </a:r>
             <a:r>
-              <a:rPr lang="fr-FR" sz="2800" dirty="0">
-                <a:solidFill>
-                  <a:srgbClr val="000000"/>
-                </a:solidFill>
-                <a:latin typeface="Consolas" panose="020B0609020204030204" pitchFamily="49" charset="0"/>
-              </a:rPr>
-              <a:t> = </a:t>
-            </a:r>
-            <a:r>
-              <a:rPr lang="fr-FR" sz="2800" dirty="0">
-                <a:solidFill>
-                  <a:srgbClr val="09885A"/>
-                </a:solidFill>
-                <a:latin typeface="Consolas" panose="020B0609020204030204" pitchFamily="49" charset="0"/>
-              </a:rPr>
-              <a:t>1729</a:t>
-            </a:r>
-            <a:r>
-              <a:rPr lang="fr-FR" sz="2800" dirty="0">
-                <a:solidFill>
-                  <a:srgbClr val="000000"/>
-                </a:solidFill>
-                <a:latin typeface="Consolas" panose="020B0609020204030204" pitchFamily="49" charset="0"/>
-              </a:rPr>
-              <a:t>;</a:t>
-            </a:r>
-          </a:p>
-          <a:p>
+              <a:rPr lang="en-US" sz="2800" dirty="0">
+                <a:solidFill>
+                  <a:srgbClr val="000000"/>
+                </a:solidFill>
+                <a:latin typeface="Consolas" panose="020B0609020204030204" pitchFamily="49" charset="0"/>
+              </a:rPr>
+              <a:t>);</a:t>
+            </a:r>
+          </a:p>
+          <a:p>
+            <a:r>
+              <a:rPr lang="en-US" sz="2800" dirty="0">
+                <a:solidFill>
+                  <a:srgbClr val="000000"/>
+                </a:solidFill>
+                <a:latin typeface="Consolas" panose="020B0609020204030204" pitchFamily="49" charset="0"/>
+              </a:rPr>
+              <a:t>}</a:t>
+            </a:r>
             <a:br>
-              <a:rPr lang="fr-FR" sz="2800" dirty="0">
+              <a:rPr lang="en-US" sz="2800" dirty="0">
                 <a:solidFill>
                   <a:srgbClr val="000000"/>
                 </a:solidFill>
                 <a:latin typeface="Consolas" panose="020B0609020204030204" pitchFamily="49" charset="0"/>
               </a:rPr>
             </a:br>
-            <a:r>
-              <a:rPr lang="fr-FR" sz="2800" dirty="0">
-                <a:solidFill>
-                  <a:srgbClr val="000000"/>
-                </a:solidFill>
-                <a:latin typeface="Consolas" panose="020B0609020204030204" pitchFamily="49" charset="0"/>
-              </a:rPr>
-              <a:t>    </a:t>
-            </a:r>
-            <a:r>
-              <a:rPr lang="fr-FR" sz="2800" dirty="0" err="1">
-                <a:solidFill>
-                  <a:srgbClr val="000000"/>
-                </a:solidFill>
-                <a:latin typeface="Consolas" panose="020B0609020204030204" pitchFamily="49" charset="0"/>
-              </a:rPr>
-              <a:t>print_example</a:t>
-            </a:r>
-            <a:r>
-              <a:rPr lang="fr-FR" sz="2800" dirty="0">
-                <a:solidFill>
-                  <a:srgbClr val="000000"/>
-                </a:solidFill>
-                <a:latin typeface="Consolas" panose="020B0609020204030204" pitchFamily="49" charset="0"/>
-              </a:rPr>
-              <a:t>(ex);</a:t>
-            </a:r>
-          </a:p>
-          <a:p>
-            <a:r>
-              <a:rPr lang="fr-FR" sz="2800" dirty="0">
-                <a:solidFill>
-                  <a:srgbClr val="000000"/>
-                </a:solidFill>
-                <a:latin typeface="Consolas" panose="020B0609020204030204" pitchFamily="49" charset="0"/>
-              </a:rPr>
-              <a:t>}</a:t>
-            </a:r>
-          </a:p>
-          <a:p>
-            <a:br>
-              <a:rPr lang="fr-FR" sz="2800" dirty="0">
-                <a:solidFill>
-                  <a:srgbClr val="000000"/>
-                </a:solidFill>
-                <a:latin typeface="Consolas" panose="020B0609020204030204" pitchFamily="49" charset="0"/>
-              </a:rPr>
-            </a:br>
-            <a:endParaRPr lang="fr-FR" sz="2800" b="0" dirty="0">
+            <a:endParaRPr lang="en-US" sz="2800" b="0" dirty="0">
               <a:solidFill>
                 <a:srgbClr val="000000"/>
               </a:solidFill>
@@ -6337,220 +6339,10 @@
           </a:p>
         </p:txBody>
       </p:sp>
-      <p:sp>
-        <p:nvSpPr>
-          <p:cNvPr id="4" name="Rectangle 3">
-            <a:extLst>
-              <a:ext uri="{FF2B5EF4-FFF2-40B4-BE49-F238E27FC236}">
-                <a16:creationId xmlns:a16="http://schemas.microsoft.com/office/drawing/2014/main" id="{D8D793E0-A327-47A7-AD6C-FB4518B96101}"/>
-              </a:ext>
-            </a:extLst>
-          </p:cNvPr>
-          <p:cNvSpPr/>
-          <p:nvPr/>
-        </p:nvSpPr>
-        <p:spPr>
-          <a:xfrm>
-            <a:off x="5645603" y="1284825"/>
-            <a:ext cx="5229225" cy="4832092"/>
-          </a:xfrm>
-          <a:prstGeom prst="rect">
-            <a:avLst/>
-          </a:prstGeom>
-        </p:spPr>
-        <p:txBody>
-          <a:bodyPr wrap="square">
-            <a:spAutoFit/>
-          </a:bodyPr>
-          <a:lstStyle/>
-          <a:p>
-            <a:r>
-              <a:rPr lang="fr-FR" sz="2800" dirty="0" err="1">
-                <a:solidFill>
-                  <a:srgbClr val="0000FF"/>
-                </a:solidFill>
-                <a:latin typeface="Consolas" panose="020B0609020204030204" pitchFamily="49" charset="0"/>
-              </a:rPr>
-              <a:t>int</a:t>
-            </a:r>
-            <a:r>
-              <a:rPr lang="fr-FR" sz="2800" dirty="0">
-                <a:solidFill>
-                  <a:srgbClr val="000000"/>
-                </a:solidFill>
-                <a:latin typeface="Consolas" panose="020B0609020204030204" pitchFamily="49" charset="0"/>
-              </a:rPr>
-              <a:t> main() {</a:t>
-            </a:r>
-          </a:p>
-          <a:p>
-            <a:r>
-              <a:rPr lang="fr-FR" sz="2800" dirty="0">
-                <a:solidFill>
-                  <a:srgbClr val="000000"/>
-                </a:solidFill>
-                <a:latin typeface="Consolas" panose="020B0609020204030204" pitchFamily="49" charset="0"/>
-              </a:rPr>
-              <a:t>    </a:t>
-            </a:r>
-            <a:r>
-              <a:rPr lang="fr-FR" sz="2800" dirty="0" err="1">
-                <a:solidFill>
-                  <a:srgbClr val="000000"/>
-                </a:solidFill>
-                <a:latin typeface="Consolas" panose="020B0609020204030204" pitchFamily="49" charset="0"/>
-              </a:rPr>
-              <a:t>example</a:t>
-            </a:r>
-            <a:r>
-              <a:rPr lang="fr-FR" sz="2800" dirty="0">
-                <a:solidFill>
-                  <a:srgbClr val="000000"/>
-                </a:solidFill>
-                <a:latin typeface="Consolas" panose="020B0609020204030204" pitchFamily="49" charset="0"/>
-              </a:rPr>
-              <a:t> ex;</a:t>
-            </a:r>
-            <a:br>
-              <a:rPr lang="fr-FR" sz="2800" dirty="0">
-                <a:solidFill>
-                  <a:srgbClr val="000000"/>
-                </a:solidFill>
-                <a:latin typeface="Consolas" panose="020B0609020204030204" pitchFamily="49" charset="0"/>
-              </a:rPr>
-            </a:br>
-            <a:r>
-              <a:rPr lang="fr-FR" sz="2800" dirty="0">
-                <a:solidFill>
-                  <a:srgbClr val="000000"/>
-                </a:solidFill>
-                <a:latin typeface="Consolas" panose="020B0609020204030204" pitchFamily="49" charset="0"/>
-              </a:rPr>
-              <a:t>    </a:t>
-            </a:r>
-            <a:r>
-              <a:rPr lang="en-US" sz="2800" dirty="0">
-                <a:solidFill>
-                  <a:srgbClr val="0000FF"/>
-                </a:solidFill>
-                <a:latin typeface="Consolas" panose="020B0609020204030204" pitchFamily="49" charset="0"/>
-              </a:rPr>
-              <a:t>auto</a:t>
-            </a:r>
-            <a:r>
-              <a:rPr lang="en-US" sz="2800" dirty="0">
-                <a:solidFill>
-                  <a:srgbClr val="000000"/>
-                </a:solidFill>
-                <a:latin typeface="Consolas" panose="020B0609020204030204" pitchFamily="49" charset="0"/>
-              </a:rPr>
-              <a:t>&amp; [d, e, f] = ex;</a:t>
-            </a:r>
-          </a:p>
-          <a:p>
-            <a:r>
-              <a:rPr lang="en-US" sz="2800" dirty="0">
-                <a:solidFill>
-                  <a:srgbClr val="000000"/>
-                </a:solidFill>
-                <a:latin typeface="Consolas" panose="020B0609020204030204" pitchFamily="49" charset="0"/>
-              </a:rPr>
-              <a:t>    d = 42;</a:t>
-            </a:r>
-          </a:p>
-          <a:p>
-            <a:r>
-              <a:rPr lang="en-US" sz="2800" dirty="0">
-                <a:solidFill>
-                  <a:srgbClr val="000000"/>
-                </a:solidFill>
-                <a:latin typeface="Consolas" panose="020B0609020204030204" pitchFamily="49" charset="0"/>
-              </a:rPr>
-              <a:t>    e = 1234;</a:t>
-            </a:r>
-          </a:p>
-          <a:p>
-            <a:r>
-              <a:rPr lang="en-US" sz="2800" dirty="0">
-                <a:solidFill>
-                  <a:srgbClr val="000000"/>
-                </a:solidFill>
-                <a:latin typeface="Consolas" panose="020B0609020204030204" pitchFamily="49" charset="0"/>
-              </a:rPr>
-              <a:t>    f = 1729;</a:t>
-            </a:r>
-          </a:p>
-          <a:p>
-            <a:br>
-              <a:rPr lang="fr-FR" sz="2800" dirty="0">
-                <a:solidFill>
-                  <a:srgbClr val="000000"/>
-                </a:solidFill>
-                <a:latin typeface="Consolas" panose="020B0609020204030204" pitchFamily="49" charset="0"/>
-              </a:rPr>
-            </a:br>
-            <a:r>
-              <a:rPr lang="fr-FR" sz="2800" dirty="0">
-                <a:solidFill>
-                  <a:srgbClr val="000000"/>
-                </a:solidFill>
-                <a:latin typeface="Consolas" panose="020B0609020204030204" pitchFamily="49" charset="0"/>
-              </a:rPr>
-              <a:t>    </a:t>
-            </a:r>
-            <a:r>
-              <a:rPr lang="fr-FR" sz="2800" dirty="0" err="1">
-                <a:solidFill>
-                  <a:srgbClr val="000000"/>
-                </a:solidFill>
-                <a:latin typeface="Consolas" panose="020B0609020204030204" pitchFamily="49" charset="0"/>
-              </a:rPr>
-              <a:t>print_example</a:t>
-            </a:r>
-            <a:r>
-              <a:rPr lang="fr-FR" sz="2800" dirty="0">
-                <a:solidFill>
-                  <a:srgbClr val="000000"/>
-                </a:solidFill>
-                <a:latin typeface="Consolas" panose="020B0609020204030204" pitchFamily="49" charset="0"/>
-              </a:rPr>
-              <a:t>(ex);</a:t>
-            </a:r>
-          </a:p>
-          <a:p>
-            <a:r>
-              <a:rPr lang="fr-FR" sz="2800" dirty="0">
-                <a:solidFill>
-                  <a:srgbClr val="000000"/>
-                </a:solidFill>
-                <a:latin typeface="Consolas" panose="020B0609020204030204" pitchFamily="49" charset="0"/>
-              </a:rPr>
-              <a:t>}</a:t>
-            </a:r>
-          </a:p>
-          <a:p>
-            <a:br>
-              <a:rPr lang="fr-FR" sz="2800" dirty="0">
-                <a:solidFill>
-                  <a:srgbClr val="000000"/>
-                </a:solidFill>
-                <a:latin typeface="Consolas" panose="020B0609020204030204" pitchFamily="49" charset="0"/>
-              </a:rPr>
-            </a:br>
-            <a:endParaRPr lang="fr-FR" sz="2800" b="0" dirty="0">
-              <a:solidFill>
-                <a:srgbClr val="000000"/>
-              </a:solidFill>
-              <a:effectLst/>
-              <a:latin typeface="Consolas" panose="020B0609020204030204" pitchFamily="49" charset="0"/>
-            </a:endParaRPr>
-          </a:p>
-        </p:txBody>
-      </p:sp>
     </p:spTree>
     <p:extLst>
       <p:ext uri="{BB962C8B-B14F-4D97-AF65-F5344CB8AC3E}">
-        <p14:creationId xmlns:p14="http://schemas.microsoft.com/office/powerpoint/2010/main" val="3948660682"/>
+        <p14:creationId xmlns:p14="http://schemas.microsoft.com/office/powerpoint/2010/main" val="833190232"/>
       </p:ext>
     </p:extLst>
   </p:cSld>
@@ -6582,7 +6374,7 @@
           <p:cNvPr id="2" name="Title 1">
             <a:extLst>
               <a:ext uri="{FF2B5EF4-FFF2-40B4-BE49-F238E27FC236}">
-                <a16:creationId xmlns:a16="http://schemas.microsoft.com/office/drawing/2014/main" id="{E780FC5C-8A55-4472-9017-E1B6C53ED32B}"/>
+                <a16:creationId xmlns:a16="http://schemas.microsoft.com/office/drawing/2014/main" id="{F8D7EFA3-1ED3-4AEB-851A-131E7EB67CD4}"/>
               </a:ext>
             </a:extLst>
           </p:cNvPr>
@@ -6607,10 +6399,10 @@
       </p:sp>
       <p:sp>
         <p:nvSpPr>
-          <p:cNvPr id="4" name="Rectangle 3">
+          <p:cNvPr id="3" name="Rectangle 2">
             <a:extLst>
               <a:ext uri="{FF2B5EF4-FFF2-40B4-BE49-F238E27FC236}">
-                <a16:creationId xmlns:a16="http://schemas.microsoft.com/office/drawing/2014/main" id="{2DD59A5C-3BEF-4680-8DA2-5C14A7C7DA5E}"/>
+                <a16:creationId xmlns:a16="http://schemas.microsoft.com/office/drawing/2014/main" id="{93559E43-8305-439A-A434-ED283D37CAC0}"/>
               </a:ext>
             </a:extLst>
           </p:cNvPr>
@@ -6619,8 +6411,8 @@
         </p:nvSpPr>
         <p:spPr>
           <a:xfrm>
-            <a:off x="1943021" y="3334138"/>
-            <a:ext cx="7470399" cy="830997"/>
+            <a:off x="782411" y="1467160"/>
+            <a:ext cx="4626428" cy="4401205"/>
           </a:xfrm>
           <a:prstGeom prst="rect">
             <a:avLst/>
@@ -6633,32 +6425,267 @@
           <a:lstStyle/>
           <a:p>
             <a:r>
-              <a:rPr lang="en-US" sz="4800" dirty="0">
+              <a:rPr lang="fr-FR" sz="2800" dirty="0" err="1">
                 <a:solidFill>
                   <a:srgbClr val="0000FF"/>
                 </a:solidFill>
                 <a:latin typeface="Consolas" panose="020B0609020204030204" pitchFamily="49" charset="0"/>
               </a:rPr>
-              <a:t>auto</a:t>
-            </a:r>
-            <a:r>
-              <a:rPr lang="en-US" sz="4800" dirty="0">
-                <a:solidFill>
-                  <a:srgbClr val="000000"/>
-                </a:solidFill>
-                <a:latin typeface="Consolas" panose="020B0609020204030204" pitchFamily="49" charset="0"/>
-              </a:rPr>
-              <a:t>&amp; [d, e, f] = ex;</a:t>
-            </a:r>
+              <a:t>int</a:t>
+            </a:r>
+            <a:r>
+              <a:rPr lang="fr-FR" sz="2800" dirty="0">
+                <a:solidFill>
+                  <a:srgbClr val="000000"/>
+                </a:solidFill>
+                <a:latin typeface="Consolas" panose="020B0609020204030204" pitchFamily="49" charset="0"/>
+              </a:rPr>
+              <a:t> main() {</a:t>
+            </a:r>
+          </a:p>
+          <a:p>
+            <a:r>
+              <a:rPr lang="fr-FR" sz="2800" dirty="0">
+                <a:solidFill>
+                  <a:srgbClr val="000000"/>
+                </a:solidFill>
+                <a:latin typeface="Consolas" panose="020B0609020204030204" pitchFamily="49" charset="0"/>
+              </a:rPr>
+              <a:t>    </a:t>
+            </a:r>
+            <a:r>
+              <a:rPr lang="fr-FR" sz="2800" dirty="0" err="1">
+                <a:solidFill>
+                  <a:srgbClr val="000000"/>
+                </a:solidFill>
+                <a:latin typeface="Consolas" panose="020B0609020204030204" pitchFamily="49" charset="0"/>
+              </a:rPr>
+              <a:t>example</a:t>
+            </a:r>
+            <a:r>
+              <a:rPr lang="fr-FR" sz="2800" dirty="0">
+                <a:solidFill>
+                  <a:srgbClr val="000000"/>
+                </a:solidFill>
+                <a:latin typeface="Consolas" panose="020B0609020204030204" pitchFamily="49" charset="0"/>
+              </a:rPr>
+              <a:t> ex;</a:t>
+            </a:r>
+          </a:p>
+          <a:p>
+            <a:r>
+              <a:rPr lang="fr-FR" sz="2800" dirty="0">
+                <a:solidFill>
+                  <a:srgbClr val="000000"/>
+                </a:solidFill>
+                <a:latin typeface="Consolas" panose="020B0609020204030204" pitchFamily="49" charset="0"/>
+              </a:rPr>
+              <a:t>    </a:t>
+            </a:r>
+            <a:r>
+              <a:rPr lang="fr-FR" sz="2800" dirty="0" err="1">
+                <a:solidFill>
+                  <a:srgbClr val="000000"/>
+                </a:solidFill>
+                <a:latin typeface="Consolas" panose="020B0609020204030204" pitchFamily="49" charset="0"/>
+              </a:rPr>
+              <a:t>ex.a</a:t>
+            </a:r>
+            <a:r>
+              <a:rPr lang="fr-FR" sz="2800" dirty="0">
+                <a:solidFill>
+                  <a:srgbClr val="000000"/>
+                </a:solidFill>
+                <a:latin typeface="Consolas" panose="020B0609020204030204" pitchFamily="49" charset="0"/>
+              </a:rPr>
+              <a:t> = </a:t>
+            </a:r>
+            <a:r>
+              <a:rPr lang="fr-FR" sz="2800" dirty="0">
+                <a:solidFill>
+                  <a:srgbClr val="09885A"/>
+                </a:solidFill>
+                <a:latin typeface="Consolas" panose="020B0609020204030204" pitchFamily="49" charset="0"/>
+              </a:rPr>
+              <a:t>42</a:t>
+            </a:r>
+            <a:r>
+              <a:rPr lang="fr-FR" sz="2800" dirty="0">
+                <a:solidFill>
+                  <a:srgbClr val="000000"/>
+                </a:solidFill>
+                <a:latin typeface="Consolas" panose="020B0609020204030204" pitchFamily="49" charset="0"/>
+              </a:rPr>
+              <a:t>;</a:t>
+            </a:r>
+          </a:p>
+          <a:p>
+            <a:r>
+              <a:rPr lang="fr-FR" sz="2800" dirty="0">
+                <a:solidFill>
+                  <a:srgbClr val="000000"/>
+                </a:solidFill>
+                <a:latin typeface="Consolas" panose="020B0609020204030204" pitchFamily="49" charset="0"/>
+              </a:rPr>
+              <a:t>    </a:t>
+            </a:r>
+            <a:r>
+              <a:rPr lang="fr-FR" sz="2800" dirty="0" err="1">
+                <a:solidFill>
+                  <a:srgbClr val="000000"/>
+                </a:solidFill>
+                <a:latin typeface="Consolas" panose="020B0609020204030204" pitchFamily="49" charset="0"/>
+              </a:rPr>
+              <a:t>ex.b</a:t>
+            </a:r>
+            <a:r>
+              <a:rPr lang="fr-FR" sz="2800" dirty="0">
+                <a:solidFill>
+                  <a:srgbClr val="000000"/>
+                </a:solidFill>
+                <a:latin typeface="Consolas" panose="020B0609020204030204" pitchFamily="49" charset="0"/>
+              </a:rPr>
+              <a:t> = </a:t>
+            </a:r>
+            <a:r>
+              <a:rPr lang="fr-FR" sz="2800" dirty="0">
+                <a:solidFill>
+                  <a:srgbClr val="09885A"/>
+                </a:solidFill>
+                <a:latin typeface="Consolas" panose="020B0609020204030204" pitchFamily="49" charset="0"/>
+              </a:rPr>
+              <a:t>1234</a:t>
+            </a:r>
+            <a:r>
+              <a:rPr lang="fr-FR" sz="2800" dirty="0">
+                <a:solidFill>
+                  <a:srgbClr val="000000"/>
+                </a:solidFill>
+                <a:latin typeface="Consolas" panose="020B0609020204030204" pitchFamily="49" charset="0"/>
+              </a:rPr>
+              <a:t>;</a:t>
+            </a:r>
+          </a:p>
+          <a:p>
+            <a:r>
+              <a:rPr lang="fr-FR" sz="2800" dirty="0">
+                <a:solidFill>
+                  <a:srgbClr val="000000"/>
+                </a:solidFill>
+                <a:latin typeface="Consolas" panose="020B0609020204030204" pitchFamily="49" charset="0"/>
+              </a:rPr>
+              <a:t>    </a:t>
+            </a:r>
+            <a:r>
+              <a:rPr lang="fr-FR" sz="2800" dirty="0" err="1">
+                <a:solidFill>
+                  <a:srgbClr val="000000"/>
+                </a:solidFill>
+                <a:latin typeface="Consolas" panose="020B0609020204030204" pitchFamily="49" charset="0"/>
+              </a:rPr>
+              <a:t>ex.c</a:t>
+            </a:r>
+            <a:r>
+              <a:rPr lang="fr-FR" sz="2800" dirty="0">
+                <a:solidFill>
+                  <a:srgbClr val="000000"/>
+                </a:solidFill>
+                <a:latin typeface="Consolas" panose="020B0609020204030204" pitchFamily="49" charset="0"/>
+              </a:rPr>
+              <a:t> = </a:t>
+            </a:r>
+            <a:r>
+              <a:rPr lang="fr-FR" sz="2800" dirty="0">
+                <a:solidFill>
+                  <a:srgbClr val="09885A"/>
+                </a:solidFill>
+                <a:latin typeface="Consolas" panose="020B0609020204030204" pitchFamily="49" charset="0"/>
+              </a:rPr>
+              <a:t>1729</a:t>
+            </a:r>
+            <a:r>
+              <a:rPr lang="fr-FR" sz="2800" dirty="0">
+                <a:solidFill>
+                  <a:srgbClr val="000000"/>
+                </a:solidFill>
+                <a:latin typeface="Consolas" panose="020B0609020204030204" pitchFamily="49" charset="0"/>
+              </a:rPr>
+              <a:t>;</a:t>
+            </a:r>
+          </a:p>
+          <a:p>
+            <a:br>
+              <a:rPr lang="fr-FR" sz="2800" dirty="0">
+                <a:solidFill>
+                  <a:srgbClr val="000000"/>
+                </a:solidFill>
+                <a:latin typeface="Consolas" panose="020B0609020204030204" pitchFamily="49" charset="0"/>
+              </a:rPr>
+            </a:br>
+            <a:r>
+              <a:rPr lang="fr-FR" sz="2800" dirty="0">
+                <a:solidFill>
+                  <a:srgbClr val="000000"/>
+                </a:solidFill>
+                <a:latin typeface="Consolas" panose="020B0609020204030204" pitchFamily="49" charset="0"/>
+              </a:rPr>
+              <a:t>    </a:t>
+            </a:r>
+            <a:r>
+              <a:rPr lang="fr-FR" sz="2800" dirty="0" err="1">
+                <a:solidFill>
+                  <a:srgbClr val="000000"/>
+                </a:solidFill>
+                <a:latin typeface="Consolas" panose="020B0609020204030204" pitchFamily="49" charset="0"/>
+              </a:rPr>
+              <a:t>print_example</a:t>
+            </a:r>
+            <a:r>
+              <a:rPr lang="fr-FR" sz="2800" dirty="0">
+                <a:solidFill>
+                  <a:srgbClr val="000000"/>
+                </a:solidFill>
+                <a:latin typeface="Consolas" panose="020B0609020204030204" pitchFamily="49" charset="0"/>
+              </a:rPr>
+              <a:t>(ex);</a:t>
+            </a:r>
+          </a:p>
+          <a:p>
+            <a:r>
+              <a:rPr lang="fr-FR" sz="2800" dirty="0">
+                <a:solidFill>
+                  <a:srgbClr val="000000"/>
+                </a:solidFill>
+                <a:latin typeface="Consolas" panose="020B0609020204030204" pitchFamily="49" charset="0"/>
+              </a:rPr>
+              <a:t>}</a:t>
+            </a:r>
+          </a:p>
+          <a:p>
+            <a:br>
+              <a:rPr lang="fr-FR" sz="2800" dirty="0">
+                <a:solidFill>
+                  <a:srgbClr val="000000"/>
+                </a:solidFill>
+                <a:latin typeface="Consolas" panose="020B0609020204030204" pitchFamily="49" charset="0"/>
+              </a:rPr>
+            </a:br>
+            <a:endParaRPr lang="fr-FR" sz="2800" b="0" dirty="0">
+              <a:solidFill>
+                <a:srgbClr val="000000"/>
+              </a:solidFill>
+              <a:effectLst/>
+              <a:latin typeface="Consolas" panose="020B0609020204030204" pitchFamily="49" charset="0"/>
+            </a:endParaRPr>
           </a:p>
         </p:txBody>
       </p:sp>
       <p:sp>
         <p:nvSpPr>
-          <p:cNvPr id="8" name="Callout: Down Arrow 7">
+          <p:cNvPr id="4" name="Rectangle 3">
             <a:extLst>
               <a:ext uri="{FF2B5EF4-FFF2-40B4-BE49-F238E27FC236}">
-                <a16:creationId xmlns:a16="http://schemas.microsoft.com/office/drawing/2014/main" id="{41817E8E-8C99-41F8-A6B3-2A79ACC66404}"/>
+                <a16:creationId xmlns:a16="http://schemas.microsoft.com/office/drawing/2014/main" id="{D8D793E0-A327-47A7-AD6C-FB4518B96101}"/>
               </a:ext>
             </a:extLst>
           </p:cNvPr>
@@ -6667,143 +6694,206 @@
         </p:nvSpPr>
         <p:spPr>
           <a:xfrm>
-            <a:off x="1820556" y="2163536"/>
-            <a:ext cx="2237093" cy="1265464"/>
+            <a:off x="5645603" y="1284825"/>
+            <a:ext cx="5229225" cy="4832092"/>
           </a:xfrm>
-          <a:prstGeom prst="downArrowCallout">
+          <a:prstGeom prst="rect">
             <a:avLst/>
           </a:prstGeom>
         </p:spPr>
-        <p:style>
-          <a:lnRef idx="2">
-            <a:schemeClr val="accent1">
-              <a:shade val="50000"/>
-            </a:schemeClr>
-          </a:lnRef>
-          <a:fillRef idx="1">
-            <a:schemeClr val="accent1"/>
-          </a:fillRef>
-          <a:effectRef idx="0">
-            <a:schemeClr val="accent1"/>
-          </a:effectRef>
-          <a:fontRef idx="minor">
-            <a:schemeClr val="lt1"/>
-          </a:fontRef>
-        </p:style>
         <p:txBody>
-          <a:bodyPr rtlCol="0" anchor="ctr"/>
+          <a:bodyPr wrap="square">
+            <a:spAutoFit/>
+          </a:bodyPr>
           <a:lstStyle/>
           <a:p>
-            <a:pPr algn="ctr"/>
-            <a:r>
-              <a:rPr lang="en-US" dirty="0"/>
-              <a:t>Type of unnamed tuple-like object</a:t>
-            </a:r>
-          </a:p>
-        </p:txBody>
-      </p:sp>
-      <p:sp>
-        <p:nvSpPr>
-          <p:cNvPr id="9" name="Callout: Down Arrow 8">
-            <a:extLst>
-              <a:ext uri="{FF2B5EF4-FFF2-40B4-BE49-F238E27FC236}">
-                <a16:creationId xmlns:a16="http://schemas.microsoft.com/office/drawing/2014/main" id="{AAFC38FB-CDA4-4721-8C51-BAE129943C0F}"/>
-              </a:ext>
-            </a:extLst>
-          </p:cNvPr>
-          <p:cNvSpPr/>
-          <p:nvPr/>
-        </p:nvSpPr>
-        <p:spPr>
-          <a:xfrm>
-            <a:off x="4306661" y="2163536"/>
-            <a:ext cx="2592160" cy="1265464"/>
-          </a:xfrm>
-          <a:prstGeom prst="downArrowCallout">
-            <a:avLst/>
-          </a:prstGeom>
-        </p:spPr>
-        <p:style>
-          <a:lnRef idx="2">
-            <a:schemeClr val="accent1">
-              <a:shade val="50000"/>
-            </a:schemeClr>
-          </a:lnRef>
-          <a:fillRef idx="1">
-            <a:schemeClr val="accent1"/>
-          </a:fillRef>
-          <a:effectRef idx="0">
-            <a:schemeClr val="accent1"/>
-          </a:effectRef>
-          <a:fontRef idx="minor">
-            <a:schemeClr val="lt1"/>
-          </a:fontRef>
-        </p:style>
-        <p:txBody>
-          <a:bodyPr rtlCol="0" anchor="ctr"/>
-          <a:lstStyle/>
-          <a:p>
-            <a:pPr algn="ctr"/>
-            <a:r>
-              <a:rPr lang="en-US" dirty="0"/>
-              <a:t>Names of aliases for “members”</a:t>
-            </a:r>
-          </a:p>
-        </p:txBody>
-      </p:sp>
-      <p:sp>
-        <p:nvSpPr>
-          <p:cNvPr id="10" name="Callout: Down Arrow 9">
-            <a:extLst>
-              <a:ext uri="{FF2B5EF4-FFF2-40B4-BE49-F238E27FC236}">
-                <a16:creationId xmlns:a16="http://schemas.microsoft.com/office/drawing/2014/main" id="{20AA6766-AE43-4F5E-A01E-8F3C9F87BAF9}"/>
-              </a:ext>
-            </a:extLst>
-          </p:cNvPr>
-          <p:cNvSpPr/>
-          <p:nvPr/>
-        </p:nvSpPr>
-        <p:spPr>
-          <a:xfrm>
-            <a:off x="7124023" y="2163536"/>
-            <a:ext cx="2592160" cy="1265464"/>
-          </a:xfrm>
-          <a:prstGeom prst="downArrowCallout">
-            <a:avLst/>
-          </a:prstGeom>
-        </p:spPr>
-        <p:style>
-          <a:lnRef idx="2">
-            <a:schemeClr val="accent1">
-              <a:shade val="50000"/>
-            </a:schemeClr>
-          </a:lnRef>
-          <a:fillRef idx="1">
-            <a:schemeClr val="accent1"/>
-          </a:fillRef>
-          <a:effectRef idx="0">
-            <a:schemeClr val="accent1"/>
-          </a:effectRef>
-          <a:fontRef idx="minor">
-            <a:schemeClr val="lt1"/>
-          </a:fontRef>
-        </p:style>
-        <p:txBody>
-          <a:bodyPr rtlCol="0" anchor="ctr"/>
-          <a:lstStyle/>
-          <a:p>
-            <a:pPr algn="ctr"/>
-            <a:r>
-              <a:rPr lang="en-US" dirty="0"/>
-              <a:t>Any initializing expression</a:t>
-            </a:r>
+            <a:r>
+              <a:rPr lang="fr-FR" sz="2800" dirty="0" err="1">
+                <a:solidFill>
+                  <a:srgbClr val="0000FF"/>
+                </a:solidFill>
+                <a:latin typeface="Consolas" panose="020B0609020204030204" pitchFamily="49" charset="0"/>
+              </a:rPr>
+              <a:t>int</a:t>
+            </a:r>
+            <a:r>
+              <a:rPr lang="fr-FR" sz="2800" dirty="0">
+                <a:solidFill>
+                  <a:srgbClr val="000000"/>
+                </a:solidFill>
+                <a:latin typeface="Consolas" panose="020B0609020204030204" pitchFamily="49" charset="0"/>
+              </a:rPr>
+              <a:t> main() {</a:t>
+            </a:r>
+          </a:p>
+          <a:p>
+            <a:r>
+              <a:rPr lang="fr-FR" sz="2800" dirty="0">
+                <a:solidFill>
+                  <a:srgbClr val="000000"/>
+                </a:solidFill>
+                <a:latin typeface="Consolas" panose="020B0609020204030204" pitchFamily="49" charset="0"/>
+              </a:rPr>
+              <a:t>    </a:t>
+            </a:r>
+            <a:r>
+              <a:rPr lang="fr-FR" sz="2800" dirty="0" err="1">
+                <a:solidFill>
+                  <a:srgbClr val="000000"/>
+                </a:solidFill>
+                <a:latin typeface="Consolas" panose="020B0609020204030204" pitchFamily="49" charset="0"/>
+              </a:rPr>
+              <a:t>example</a:t>
+            </a:r>
+            <a:r>
+              <a:rPr lang="fr-FR" sz="2800" dirty="0">
+                <a:solidFill>
+                  <a:srgbClr val="000000"/>
+                </a:solidFill>
+                <a:latin typeface="Consolas" panose="020B0609020204030204" pitchFamily="49" charset="0"/>
+              </a:rPr>
+              <a:t> ex;</a:t>
+            </a:r>
+            <a:br>
+              <a:rPr lang="fr-FR" sz="2800" dirty="0">
+                <a:solidFill>
+                  <a:srgbClr val="000000"/>
+                </a:solidFill>
+                <a:latin typeface="Consolas" panose="020B0609020204030204" pitchFamily="49" charset="0"/>
+              </a:rPr>
+            </a:br>
+            <a:r>
+              <a:rPr lang="fr-FR" sz="2800" dirty="0">
+                <a:solidFill>
+                  <a:srgbClr val="000000"/>
+                </a:solidFill>
+                <a:latin typeface="Consolas" panose="020B0609020204030204" pitchFamily="49" charset="0"/>
+              </a:rPr>
+              <a:t>    </a:t>
+            </a:r>
+            <a:r>
+              <a:rPr lang="en-US" sz="2800" dirty="0">
+                <a:solidFill>
+                  <a:srgbClr val="0000FF"/>
+                </a:solidFill>
+                <a:latin typeface="Consolas" panose="020B0609020204030204" pitchFamily="49" charset="0"/>
+              </a:rPr>
+              <a:t>auto</a:t>
+            </a:r>
+            <a:r>
+              <a:rPr lang="en-US" sz="2800" dirty="0">
+                <a:solidFill>
+                  <a:srgbClr val="000000"/>
+                </a:solidFill>
+                <a:latin typeface="Consolas" panose="020B0609020204030204" pitchFamily="49" charset="0"/>
+              </a:rPr>
+              <a:t>&amp; [d, e, f] = ex;</a:t>
+            </a:r>
+          </a:p>
+          <a:p>
+            <a:r>
+              <a:rPr lang="en-US" sz="2800" dirty="0">
+                <a:solidFill>
+                  <a:srgbClr val="000000"/>
+                </a:solidFill>
+                <a:latin typeface="Consolas" panose="020B0609020204030204" pitchFamily="49" charset="0"/>
+              </a:rPr>
+              <a:t>    d = 42;</a:t>
+            </a:r>
+          </a:p>
+          <a:p>
+            <a:r>
+              <a:rPr lang="en-US" sz="2800" dirty="0">
+                <a:solidFill>
+                  <a:srgbClr val="000000"/>
+                </a:solidFill>
+                <a:latin typeface="Consolas" panose="020B0609020204030204" pitchFamily="49" charset="0"/>
+              </a:rPr>
+              <a:t>    e = 1234;</a:t>
+            </a:r>
+          </a:p>
+          <a:p>
+            <a:r>
+              <a:rPr lang="en-US" sz="2800" dirty="0">
+                <a:solidFill>
+                  <a:srgbClr val="000000"/>
+                </a:solidFill>
+                <a:latin typeface="Consolas" panose="020B0609020204030204" pitchFamily="49" charset="0"/>
+              </a:rPr>
+              <a:t>    f = 1729;</a:t>
+            </a:r>
+          </a:p>
+          <a:p>
+            <a:br>
+              <a:rPr lang="fr-FR" sz="2800" dirty="0">
+                <a:solidFill>
+                  <a:srgbClr val="000000"/>
+                </a:solidFill>
+                <a:latin typeface="Consolas" panose="020B0609020204030204" pitchFamily="49" charset="0"/>
+              </a:rPr>
+            </a:br>
+            <a:r>
+              <a:rPr lang="fr-FR" sz="2800" dirty="0">
+                <a:solidFill>
+                  <a:srgbClr val="000000"/>
+                </a:solidFill>
+                <a:latin typeface="Consolas" panose="020B0609020204030204" pitchFamily="49" charset="0"/>
+              </a:rPr>
+              <a:t>    </a:t>
+            </a:r>
+            <a:r>
+              <a:rPr lang="fr-FR" sz="2800" dirty="0" err="1">
+                <a:solidFill>
+                  <a:srgbClr val="000000"/>
+                </a:solidFill>
+                <a:latin typeface="Consolas" panose="020B0609020204030204" pitchFamily="49" charset="0"/>
+              </a:rPr>
+              <a:t>print_example</a:t>
+            </a:r>
+            <a:r>
+              <a:rPr lang="fr-FR" sz="2800" dirty="0">
+                <a:solidFill>
+                  <a:srgbClr val="000000"/>
+                </a:solidFill>
+                <a:latin typeface="Consolas" panose="020B0609020204030204" pitchFamily="49" charset="0"/>
+              </a:rPr>
+              <a:t>(ex);</a:t>
+            </a:r>
+          </a:p>
+          <a:p>
+            <a:r>
+              <a:rPr lang="fr-FR" sz="2800" dirty="0">
+                <a:solidFill>
+                  <a:srgbClr val="000000"/>
+                </a:solidFill>
+                <a:latin typeface="Consolas" panose="020B0609020204030204" pitchFamily="49" charset="0"/>
+              </a:rPr>
+              <a:t>}</a:t>
+            </a:r>
+          </a:p>
+          <a:p>
+            <a:br>
+              <a:rPr lang="fr-FR" sz="2800" dirty="0">
+                <a:solidFill>
+                  <a:srgbClr val="000000"/>
+                </a:solidFill>
+                <a:latin typeface="Consolas" panose="020B0609020204030204" pitchFamily="49" charset="0"/>
+              </a:rPr>
+            </a:br>
+            <a:endParaRPr lang="fr-FR" sz="2800" b="0" dirty="0">
+              <a:solidFill>
+                <a:srgbClr val="000000"/>
+              </a:solidFill>
+              <a:effectLst/>
+              <a:latin typeface="Consolas" panose="020B0609020204030204" pitchFamily="49" charset="0"/>
+            </a:endParaRPr>
           </a:p>
         </p:txBody>
       </p:sp>
     </p:spTree>
     <p:extLst>
       <p:ext uri="{BB962C8B-B14F-4D97-AF65-F5344CB8AC3E}">
-        <p14:creationId xmlns:p14="http://schemas.microsoft.com/office/powerpoint/2010/main" val="3451418128"/>
+        <p14:creationId xmlns:p14="http://schemas.microsoft.com/office/powerpoint/2010/main" val="3948660682"/>
       </p:ext>
     </p:extLst>
   </p:cSld>
@@ -7729,518 +7819,6 @@
           <p:cNvPr id="2" name="Title 1">
             <a:extLst>
               <a:ext uri="{FF2B5EF4-FFF2-40B4-BE49-F238E27FC236}">
-                <a16:creationId xmlns:a16="http://schemas.microsoft.com/office/drawing/2014/main" id="{A65A0B7B-890B-4ABF-A96B-4A436A645DA1}"/>
-              </a:ext>
-            </a:extLst>
-          </p:cNvPr>
-          <p:cNvSpPr>
-            <a:spLocks noGrp="1"/>
-          </p:cNvSpPr>
-          <p:nvPr>
-            <p:ph type="title"/>
-          </p:nvPr>
-        </p:nvSpPr>
-        <p:spPr/>
-        <p:txBody>
-          <a:bodyPr/>
-          <a:lstStyle/>
-          <a:p>
-            <a:r>
-              <a:rPr lang="en-US" dirty="0"/>
-              <a:t>Structured Bindings</a:t>
-            </a:r>
-          </a:p>
-        </p:txBody>
-      </p:sp>
-      <p:sp>
-        <p:nvSpPr>
-          <p:cNvPr id="4" name="Rectangle 3">
-            <a:extLst>
-              <a:ext uri="{FF2B5EF4-FFF2-40B4-BE49-F238E27FC236}">
-                <a16:creationId xmlns:a16="http://schemas.microsoft.com/office/drawing/2014/main" id="{DF3AEFA3-1B1D-4E61-A939-4B968F39A48A}"/>
-              </a:ext>
-            </a:extLst>
-          </p:cNvPr>
-          <p:cNvSpPr/>
-          <p:nvPr/>
-        </p:nvSpPr>
-        <p:spPr>
-          <a:xfrm>
-            <a:off x="923409" y="1325636"/>
-            <a:ext cx="11481800" cy="4524315"/>
-          </a:xfrm>
-          <a:prstGeom prst="rect">
-            <a:avLst/>
-          </a:prstGeom>
-        </p:spPr>
-        <p:txBody>
-          <a:bodyPr wrap="square">
-            <a:spAutoFit/>
-          </a:bodyPr>
-          <a:lstStyle/>
-          <a:p>
-            <a:r>
-              <a:rPr lang="en-US">
-                <a:solidFill>
-                  <a:srgbClr val="0000FF"/>
-                </a:solidFill>
-                <a:latin typeface="Consolas" panose="020B0609020204030204" pitchFamily="49" charset="0"/>
-              </a:rPr>
-              <a:t>#include </a:t>
-            </a:r>
-            <a:r>
-              <a:rPr lang="en-US">
-                <a:solidFill>
-                  <a:srgbClr val="A31515"/>
-                </a:solidFill>
-                <a:latin typeface="Consolas" panose="020B0609020204030204" pitchFamily="49" charset="0"/>
-              </a:rPr>
-              <a:t>&lt;</a:t>
-            </a:r>
-            <a:r>
-              <a:rPr lang="en-US" err="1">
-                <a:solidFill>
-                  <a:srgbClr val="A31515"/>
-                </a:solidFill>
-                <a:latin typeface="Consolas" panose="020B0609020204030204" pitchFamily="49" charset="0"/>
-              </a:rPr>
-              <a:t>ntdef.h</a:t>
-            </a:r>
-            <a:r>
-              <a:rPr lang="en-US">
-                <a:solidFill>
-                  <a:srgbClr val="A31515"/>
-                </a:solidFill>
-                <a:latin typeface="Consolas" panose="020B0609020204030204" pitchFamily="49" charset="0"/>
-              </a:rPr>
-              <a:t>&gt;</a:t>
-            </a:r>
-            <a:endParaRPr lang="en-US">
-              <a:solidFill>
-                <a:srgbClr val="000000"/>
-              </a:solidFill>
-              <a:latin typeface="Consolas" panose="020B0609020204030204" pitchFamily="49" charset="0"/>
-            </a:endParaRPr>
-          </a:p>
-          <a:p>
-            <a:r>
-              <a:rPr lang="en-US">
-                <a:solidFill>
-                  <a:srgbClr val="0000FF"/>
-                </a:solidFill>
-                <a:latin typeface="Consolas" panose="020B0609020204030204" pitchFamily="49" charset="0"/>
-              </a:rPr>
-              <a:t>#include </a:t>
-            </a:r>
-            <a:r>
-              <a:rPr lang="en-US">
-                <a:solidFill>
-                  <a:srgbClr val="A31515"/>
-                </a:solidFill>
-                <a:latin typeface="Consolas" panose="020B0609020204030204" pitchFamily="49" charset="0"/>
-              </a:rPr>
-              <a:t>&lt;</a:t>
-            </a:r>
-            <a:r>
-              <a:rPr lang="en-US" err="1">
-                <a:solidFill>
-                  <a:srgbClr val="A31515"/>
-                </a:solidFill>
-                <a:latin typeface="Consolas" panose="020B0609020204030204" pitchFamily="49" charset="0"/>
-              </a:rPr>
-              <a:t>windows.h</a:t>
-            </a:r>
-            <a:r>
-              <a:rPr lang="en-US">
-                <a:solidFill>
-                  <a:srgbClr val="A31515"/>
-                </a:solidFill>
-                <a:latin typeface="Consolas" panose="020B0609020204030204" pitchFamily="49" charset="0"/>
-              </a:rPr>
-              <a:t>&gt;</a:t>
-            </a:r>
-            <a:endParaRPr lang="en-US">
-              <a:solidFill>
-                <a:srgbClr val="000000"/>
-              </a:solidFill>
-              <a:latin typeface="Consolas" panose="020B0609020204030204" pitchFamily="49" charset="0"/>
-            </a:endParaRPr>
-          </a:p>
-          <a:p>
-            <a:br>
-              <a:rPr lang="en-US">
-                <a:solidFill>
-                  <a:srgbClr val="000000"/>
-                </a:solidFill>
-                <a:latin typeface="Consolas" panose="020B0609020204030204" pitchFamily="49" charset="0"/>
-              </a:rPr>
-            </a:br>
-            <a:r>
-              <a:rPr lang="en-US">
-                <a:solidFill>
-                  <a:srgbClr val="000000"/>
-                </a:solidFill>
-                <a:latin typeface="Consolas" panose="020B0609020204030204" pitchFamily="49" charset="0"/>
-              </a:rPr>
-              <a:t>UNICODE_STRING </a:t>
-            </a:r>
-            <a:r>
-              <a:rPr lang="en-US" err="1">
-                <a:solidFill>
-                  <a:srgbClr val="000000"/>
-                </a:solidFill>
-                <a:latin typeface="Consolas" panose="020B0609020204030204" pitchFamily="49" charset="0"/>
-              </a:rPr>
-              <a:t>get_str</a:t>
-            </a:r>
-            <a:r>
-              <a:rPr lang="en-US">
-                <a:solidFill>
-                  <a:srgbClr val="000000"/>
-                </a:solidFill>
-                <a:latin typeface="Consolas" panose="020B0609020204030204" pitchFamily="49" charset="0"/>
-              </a:rPr>
-              <a:t>();</a:t>
-            </a:r>
-          </a:p>
-          <a:p>
-            <a:br>
-              <a:rPr lang="en-US">
-                <a:solidFill>
-                  <a:srgbClr val="000000"/>
-                </a:solidFill>
-                <a:latin typeface="Consolas" panose="020B0609020204030204" pitchFamily="49" charset="0"/>
-              </a:rPr>
-            </a:br>
-            <a:r>
-              <a:rPr lang="en-US">
-                <a:solidFill>
-                  <a:srgbClr val="0000FF"/>
-                </a:solidFill>
-                <a:latin typeface="Consolas" panose="020B0609020204030204" pitchFamily="49" charset="0"/>
-              </a:rPr>
-              <a:t>int</a:t>
-            </a:r>
-            <a:r>
-              <a:rPr lang="en-US">
-                <a:solidFill>
-                  <a:srgbClr val="000000"/>
-                </a:solidFill>
-                <a:latin typeface="Consolas" panose="020B0609020204030204" pitchFamily="49" charset="0"/>
-              </a:rPr>
-              <a:t> main() {</a:t>
-            </a:r>
-          </a:p>
-          <a:p>
-            <a:r>
-              <a:rPr lang="en-US">
-                <a:solidFill>
-                  <a:srgbClr val="0000FF"/>
-                </a:solidFill>
-                <a:latin typeface="Consolas" panose="020B0609020204030204" pitchFamily="49" charset="0"/>
-              </a:rPr>
-              <a:t>    auto</a:t>
-            </a:r>
-            <a:r>
-              <a:rPr lang="en-US">
-                <a:solidFill>
-                  <a:srgbClr val="000000"/>
-                </a:solidFill>
-                <a:latin typeface="Consolas" panose="020B0609020204030204" pitchFamily="49" charset="0"/>
-              </a:rPr>
-              <a:t> [Length, </a:t>
-            </a:r>
-            <a:r>
-              <a:rPr lang="en-US" err="1">
-                <a:solidFill>
-                  <a:srgbClr val="000000"/>
-                </a:solidFill>
-                <a:latin typeface="Consolas" panose="020B0609020204030204" pitchFamily="49" charset="0"/>
-              </a:rPr>
-              <a:t>MaxLength</a:t>
-            </a:r>
-            <a:r>
-              <a:rPr lang="en-US">
-                <a:solidFill>
-                  <a:srgbClr val="000000"/>
-                </a:solidFill>
-                <a:latin typeface="Consolas" panose="020B0609020204030204" pitchFamily="49" charset="0"/>
-              </a:rPr>
-              <a:t>, Buffer] = </a:t>
-            </a:r>
-            <a:r>
-              <a:rPr lang="en-US" err="1">
-                <a:solidFill>
-                  <a:srgbClr val="000000"/>
-                </a:solidFill>
-                <a:latin typeface="Consolas" panose="020B0609020204030204" pitchFamily="49" charset="0"/>
-              </a:rPr>
-              <a:t>get_str</a:t>
-            </a:r>
-            <a:r>
-              <a:rPr lang="en-US">
-                <a:solidFill>
-                  <a:srgbClr val="000000"/>
-                </a:solidFill>
-                <a:latin typeface="Consolas" panose="020B0609020204030204" pitchFamily="49" charset="0"/>
-              </a:rPr>
-              <a:t>();</a:t>
-            </a:r>
-          </a:p>
-          <a:p>
-            <a:r>
-              <a:rPr lang="en-US">
-                <a:solidFill>
-                  <a:srgbClr val="000000"/>
-                </a:solidFill>
-                <a:latin typeface="Consolas" panose="020B0609020204030204" pitchFamily="49" charset="0"/>
-              </a:rPr>
-              <a:t>    DWORD </a:t>
-            </a:r>
-            <a:r>
-              <a:rPr lang="en-US" err="1">
-                <a:solidFill>
-                  <a:srgbClr val="000000"/>
-                </a:solidFill>
-                <a:latin typeface="Consolas" panose="020B0609020204030204" pitchFamily="49" charset="0"/>
-              </a:rPr>
-              <a:t>charsWritten</a:t>
-            </a:r>
-            <a:r>
-              <a:rPr lang="en-US">
-                <a:solidFill>
-                  <a:srgbClr val="000000"/>
-                </a:solidFill>
-                <a:latin typeface="Consolas" panose="020B0609020204030204" pitchFamily="49" charset="0"/>
-              </a:rPr>
-              <a:t>;</a:t>
-            </a:r>
-          </a:p>
-          <a:p>
-            <a:r>
-              <a:rPr lang="en-US">
-                <a:solidFill>
-                  <a:srgbClr val="0000FF"/>
-                </a:solidFill>
-                <a:latin typeface="Consolas" panose="020B0609020204030204" pitchFamily="49" charset="0"/>
-              </a:rPr>
-              <a:t>    if</a:t>
-            </a:r>
-            <a:r>
-              <a:rPr lang="en-US">
-                <a:solidFill>
-                  <a:srgbClr val="000000"/>
-                </a:solidFill>
-                <a:latin typeface="Consolas" panose="020B0609020204030204" pitchFamily="49" charset="0"/>
-              </a:rPr>
-              <a:t> (!</a:t>
-            </a:r>
-            <a:r>
-              <a:rPr lang="en-US" err="1">
-                <a:solidFill>
-                  <a:srgbClr val="000000"/>
-                </a:solidFill>
-                <a:latin typeface="Consolas" panose="020B0609020204030204" pitchFamily="49" charset="0"/>
-              </a:rPr>
-              <a:t>WriteConsoleW</a:t>
-            </a:r>
-            <a:r>
-              <a:rPr lang="en-US">
-                <a:solidFill>
-                  <a:srgbClr val="000000"/>
-                </a:solidFill>
-                <a:latin typeface="Consolas" panose="020B0609020204030204" pitchFamily="49" charset="0"/>
-              </a:rPr>
-              <a:t>(</a:t>
-            </a:r>
-            <a:r>
-              <a:rPr lang="en-US" err="1">
-                <a:solidFill>
-                  <a:srgbClr val="000000"/>
-                </a:solidFill>
-                <a:latin typeface="Consolas" panose="020B0609020204030204" pitchFamily="49" charset="0"/>
-              </a:rPr>
-              <a:t>GetStdHandle</a:t>
-            </a:r>
-            <a:r>
-              <a:rPr lang="en-US">
-                <a:solidFill>
-                  <a:srgbClr val="000000"/>
-                </a:solidFill>
-                <a:latin typeface="Consolas" panose="020B0609020204030204" pitchFamily="49" charset="0"/>
-              </a:rPr>
-              <a:t>(STD_OUTPUT_HANDLE),</a:t>
-            </a:r>
-          </a:p>
-          <a:p>
-            <a:r>
-              <a:rPr lang="en-US">
-                <a:solidFill>
-                  <a:srgbClr val="000000"/>
-                </a:solidFill>
-                <a:latin typeface="Consolas" panose="020B0609020204030204" pitchFamily="49" charset="0"/>
-              </a:rPr>
-              <a:t>             Buffer, Length, &amp;</a:t>
-            </a:r>
-            <a:r>
-              <a:rPr lang="en-US" err="1">
-                <a:solidFill>
-                  <a:srgbClr val="000000"/>
-                </a:solidFill>
-                <a:latin typeface="Consolas" panose="020B0609020204030204" pitchFamily="49" charset="0"/>
-              </a:rPr>
-              <a:t>charsWritten</a:t>
-            </a:r>
-            <a:r>
-              <a:rPr lang="en-US">
-                <a:solidFill>
-                  <a:srgbClr val="000000"/>
-                </a:solidFill>
-                <a:latin typeface="Consolas" panose="020B0609020204030204" pitchFamily="49" charset="0"/>
-              </a:rPr>
-              <a:t>, </a:t>
-            </a:r>
-            <a:r>
-              <a:rPr lang="en-US" err="1">
-                <a:solidFill>
-                  <a:srgbClr val="0000FF"/>
-                </a:solidFill>
-                <a:latin typeface="Consolas" panose="020B0609020204030204" pitchFamily="49" charset="0"/>
-              </a:rPr>
-              <a:t>nullptr</a:t>
-            </a:r>
-            <a:r>
-              <a:rPr lang="en-US">
-                <a:solidFill>
-                  <a:srgbClr val="000000"/>
-                </a:solidFill>
-                <a:latin typeface="Consolas" panose="020B0609020204030204" pitchFamily="49" charset="0"/>
-              </a:rPr>
-              <a:t>)</a:t>
-            </a:r>
-          </a:p>
-          <a:p>
-            <a:r>
-              <a:rPr lang="en-US">
-                <a:solidFill>
-                  <a:srgbClr val="000000"/>
-                </a:solidFill>
-                <a:latin typeface="Consolas" panose="020B0609020204030204" pitchFamily="49" charset="0"/>
-              </a:rPr>
-              <a:t>        || </a:t>
-            </a:r>
-            <a:r>
-              <a:rPr lang="en-US" err="1">
-                <a:solidFill>
-                  <a:srgbClr val="000000"/>
-                </a:solidFill>
-                <a:latin typeface="Consolas" panose="020B0609020204030204" pitchFamily="49" charset="0"/>
-              </a:rPr>
-              <a:t>charsWritten</a:t>
-            </a:r>
-            <a:r>
-              <a:rPr lang="en-US">
-                <a:solidFill>
-                  <a:srgbClr val="000000"/>
-                </a:solidFill>
-                <a:latin typeface="Consolas" panose="020B0609020204030204" pitchFamily="49" charset="0"/>
-              </a:rPr>
-              <a:t> != Length) {</a:t>
-            </a:r>
-          </a:p>
-          <a:p>
-            <a:r>
-              <a:rPr lang="en-US">
-                <a:solidFill>
-                  <a:srgbClr val="008000"/>
-                </a:solidFill>
-                <a:latin typeface="Consolas" panose="020B0609020204030204" pitchFamily="49" charset="0"/>
-              </a:rPr>
-              <a:t>        // Writing that failed for some reason</a:t>
-            </a:r>
-            <a:endParaRPr lang="en-US">
-              <a:solidFill>
-                <a:srgbClr val="000000"/>
-              </a:solidFill>
-              <a:latin typeface="Consolas" panose="020B0609020204030204" pitchFamily="49" charset="0"/>
-            </a:endParaRPr>
-          </a:p>
-          <a:p>
-            <a:r>
-              <a:rPr lang="en-US">
-                <a:solidFill>
-                  <a:srgbClr val="000000"/>
-                </a:solidFill>
-                <a:latin typeface="Consolas" panose="020B0609020204030204" pitchFamily="49" charset="0"/>
-              </a:rPr>
-              <a:t>    }</a:t>
-            </a:r>
-          </a:p>
-          <a:p>
-            <a:r>
-              <a:rPr lang="en-US">
-                <a:solidFill>
-                  <a:srgbClr val="000000"/>
-                </a:solidFill>
-                <a:latin typeface="Consolas" panose="020B0609020204030204" pitchFamily="49" charset="0"/>
-              </a:rPr>
-              <a:t>}</a:t>
-            </a:r>
-          </a:p>
-          <a:p>
-            <a:br>
-              <a:rPr lang="en-US">
-                <a:solidFill>
-                  <a:srgbClr val="000000"/>
-                </a:solidFill>
-                <a:latin typeface="Consolas" panose="020B0609020204030204" pitchFamily="49" charset="0"/>
-              </a:rPr>
-            </a:br>
-            <a:endParaRPr lang="en-US" b="0">
-              <a:solidFill>
-                <a:srgbClr val="000000"/>
-              </a:solidFill>
-              <a:effectLst/>
-              <a:latin typeface="Consolas" panose="020B0609020204030204" pitchFamily="49" charset="0"/>
-            </a:endParaRPr>
-          </a:p>
-        </p:txBody>
-      </p:sp>
-    </p:spTree>
-    <p:extLst>
-      <p:ext uri="{BB962C8B-B14F-4D97-AF65-F5344CB8AC3E}">
-        <p14:creationId xmlns:p14="http://schemas.microsoft.com/office/powerpoint/2010/main" val="937919153"/>
-      </p:ext>
-    </p:extLst>
-  </p:cSld>
-  <p:clrMapOvr>
-    <a:masterClrMapping/>
-  </p:clrMapOvr>
-</p:sld>
-</file>
-
-<file path=ppt/slides/slide17.xml><?xml version="1.0" encoding="utf-8"?>
-<p:sld xmlns:a="http://schemas.openxmlformats.org/drawingml/2006/main" xmlns:r="http://schemas.openxmlformats.org/officeDocument/2006/relationships" xmlns:p="http://schemas.openxmlformats.org/presentationml/2006/main">
-  <p:cSld>
-    <p:spTree>
-      <p:nvGrpSpPr>
-        <p:cNvPr id="1" name=""/>
-        <p:cNvGrpSpPr/>
-        <p:nvPr/>
-      </p:nvGrpSpPr>
-      <p:grpSpPr>
-        <a:xfrm>
-          <a:off x="0" y="0"/>
-          <a:ext cx="0" cy="0"/>
-          <a:chOff x="0" y="0"/>
-          <a:chExt cx="0" cy="0"/>
-        </a:xfrm>
-      </p:grpSpPr>
-      <p:sp>
-        <p:nvSpPr>
-          <p:cNvPr id="2" name="Title 1">
-            <a:extLst>
-              <a:ext uri="{FF2B5EF4-FFF2-40B4-BE49-F238E27FC236}">
                 <a16:creationId xmlns:a16="http://schemas.microsoft.com/office/drawing/2014/main" id="{A137934B-1483-4473-AB84-2084774CC7D3}"/>
               </a:ext>
             </a:extLst>
@@ -8313,7 +7891,7 @@
 </p:sld>
 </file>
 
-<file path=ppt/slides/slide18.xml><?xml version="1.0" encoding="utf-8"?>
+<file path=ppt/slides/slide17.xml><?xml version="1.0" encoding="utf-8"?>
 <p:sld xmlns:a="http://schemas.openxmlformats.org/drawingml/2006/main" xmlns:r="http://schemas.openxmlformats.org/officeDocument/2006/relationships" xmlns:p="http://schemas.openxmlformats.org/presentationml/2006/main">
   <p:cSld>
     <p:spTree>
@@ -8396,6 +7974,262 @@
     <p:extLst>
       <p:ext uri="{BB962C8B-B14F-4D97-AF65-F5344CB8AC3E}">
         <p14:creationId xmlns:p14="http://schemas.microsoft.com/office/powerpoint/2010/main" val="521069620"/>
+      </p:ext>
+    </p:extLst>
+  </p:cSld>
+  <p:clrMapOvr>
+    <a:masterClrMapping/>
+  </p:clrMapOvr>
+</p:sld>
+</file>
+
+<file path=ppt/slides/slide18.xml><?xml version="1.0" encoding="utf-8"?>
+<p:sld xmlns:a="http://schemas.openxmlformats.org/drawingml/2006/main" xmlns:r="http://schemas.openxmlformats.org/officeDocument/2006/relationships" xmlns:p="http://schemas.openxmlformats.org/presentationml/2006/main">
+  <p:cSld>
+    <p:spTree>
+      <p:nvGrpSpPr>
+        <p:cNvPr id="1" name=""/>
+        <p:cNvGrpSpPr/>
+        <p:nvPr/>
+      </p:nvGrpSpPr>
+      <p:grpSpPr>
+        <a:xfrm>
+          <a:off x="0" y="0"/>
+          <a:ext cx="0" cy="0"/>
+          <a:chOff x="0" y="0"/>
+          <a:chExt cx="0" cy="0"/>
+        </a:xfrm>
+      </p:grpSpPr>
+      <p:sp>
+        <p:nvSpPr>
+          <p:cNvPr id="2" name="Title 1">
+            <a:extLst>
+              <a:ext uri="{FF2B5EF4-FFF2-40B4-BE49-F238E27FC236}">
+                <a16:creationId xmlns:a16="http://schemas.microsoft.com/office/drawing/2014/main" id="{577A0844-EF70-4198-8372-7FBE76AE2363}"/>
+              </a:ext>
+            </a:extLst>
+          </p:cNvPr>
+          <p:cNvSpPr>
+            <a:spLocks noGrp="1"/>
+          </p:cNvSpPr>
+          <p:nvPr>
+            <p:ph type="title"/>
+          </p:nvPr>
+        </p:nvSpPr>
+        <p:spPr/>
+        <p:txBody>
+          <a:bodyPr/>
+          <a:lstStyle/>
+          <a:p>
+            <a:r>
+              <a:rPr lang="en-US" dirty="0"/>
+              <a:t>Selection Statements with Initializers	</a:t>
+            </a:r>
+          </a:p>
+        </p:txBody>
+      </p:sp>
+      <p:sp>
+        <p:nvSpPr>
+          <p:cNvPr id="4" name="Rectangle 3">
+            <a:extLst>
+              <a:ext uri="{FF2B5EF4-FFF2-40B4-BE49-F238E27FC236}">
+                <a16:creationId xmlns:a16="http://schemas.microsoft.com/office/drawing/2014/main" id="{34B4AE5B-D447-4CD4-B670-2550611E081D}"/>
+              </a:ext>
+            </a:extLst>
+          </p:cNvPr>
+          <p:cNvSpPr/>
+          <p:nvPr/>
+        </p:nvSpPr>
+        <p:spPr>
+          <a:xfrm>
+            <a:off x="914400" y="1512193"/>
+            <a:ext cx="8225518" cy="3108543"/>
+          </a:xfrm>
+          <a:prstGeom prst="rect">
+            <a:avLst/>
+          </a:prstGeom>
+        </p:spPr>
+        <p:txBody>
+          <a:bodyPr wrap="square">
+            <a:spAutoFit/>
+          </a:bodyPr>
+          <a:lstStyle/>
+          <a:p>
+            <a:r>
+              <a:rPr lang="en-US" sz="2800" dirty="0">
+                <a:solidFill>
+                  <a:srgbClr val="000000"/>
+                </a:solidFill>
+                <a:latin typeface="Consolas" panose="020B0609020204030204" pitchFamily="49" charset="0"/>
+              </a:rPr>
+              <a:t>a();</a:t>
+            </a:r>
+          </a:p>
+          <a:p>
+            <a:r>
+              <a:rPr lang="en-US" sz="2800" dirty="0">
+                <a:solidFill>
+                  <a:srgbClr val="0000FF"/>
+                </a:solidFill>
+                <a:latin typeface="Consolas" panose="020B0609020204030204" pitchFamily="49" charset="0"/>
+              </a:rPr>
+              <a:t>if</a:t>
+            </a:r>
+            <a:r>
+              <a:rPr lang="en-US" sz="2800" dirty="0">
+                <a:solidFill>
+                  <a:srgbClr val="000000"/>
+                </a:solidFill>
+                <a:latin typeface="Consolas" panose="020B0609020204030204" pitchFamily="49" charset="0"/>
+              </a:rPr>
+              <a:t> (</a:t>
+            </a:r>
+            <a:r>
+              <a:rPr lang="en-US" sz="2800" dirty="0">
+                <a:solidFill>
+                  <a:srgbClr val="0000FF"/>
+                </a:solidFill>
+                <a:latin typeface="Consolas" panose="020B0609020204030204" pitchFamily="49" charset="0"/>
+              </a:rPr>
+              <a:t>int</a:t>
+            </a:r>
+            <a:r>
+              <a:rPr lang="en-US" sz="2800" dirty="0">
+                <a:solidFill>
+                  <a:srgbClr val="000000"/>
+                </a:solidFill>
+                <a:latin typeface="Consolas" panose="020B0609020204030204" pitchFamily="49" charset="0"/>
+              </a:rPr>
+              <a:t> var = </a:t>
+            </a:r>
+            <a:r>
+              <a:rPr lang="en-US" sz="2800" dirty="0" err="1">
+                <a:solidFill>
+                  <a:srgbClr val="000000"/>
+                </a:solidFill>
+                <a:latin typeface="Consolas" panose="020B0609020204030204" pitchFamily="49" charset="0"/>
+              </a:rPr>
+              <a:t>get_val</a:t>
+            </a:r>
+            <a:r>
+              <a:rPr lang="en-US" sz="2800" dirty="0">
+                <a:solidFill>
+                  <a:srgbClr val="000000"/>
+                </a:solidFill>
+                <a:latin typeface="Consolas" panose="020B0609020204030204" pitchFamily="49" charset="0"/>
+              </a:rPr>
+              <a:t>(); var &lt; </a:t>
+            </a:r>
+            <a:r>
+              <a:rPr lang="en-US" sz="2800" dirty="0">
+                <a:solidFill>
+                  <a:srgbClr val="09885A"/>
+                </a:solidFill>
+                <a:latin typeface="Consolas" panose="020B0609020204030204" pitchFamily="49" charset="0"/>
+              </a:rPr>
+              <a:t>42</a:t>
+            </a:r>
+            <a:r>
+              <a:rPr lang="en-US" sz="2800" dirty="0">
+                <a:solidFill>
+                  <a:srgbClr val="000000"/>
+                </a:solidFill>
+                <a:latin typeface="Consolas" panose="020B0609020204030204" pitchFamily="49" charset="0"/>
+              </a:rPr>
+              <a:t>) {</a:t>
+            </a:r>
+          </a:p>
+          <a:p>
+            <a:r>
+              <a:rPr lang="en-US" sz="2800" dirty="0">
+                <a:solidFill>
+                  <a:srgbClr val="000000"/>
+                </a:solidFill>
+                <a:latin typeface="Consolas" panose="020B0609020204030204" pitchFamily="49" charset="0"/>
+              </a:rPr>
+              <a:t>    </a:t>
+            </a:r>
+            <a:r>
+              <a:rPr lang="en-US" sz="2800" dirty="0" err="1">
+                <a:solidFill>
+                  <a:srgbClr val="000000"/>
+                </a:solidFill>
+                <a:latin typeface="Consolas" panose="020B0609020204030204" pitchFamily="49" charset="0"/>
+              </a:rPr>
+              <a:t>printf</a:t>
+            </a:r>
+            <a:r>
+              <a:rPr lang="en-US" sz="2800" dirty="0">
+                <a:solidFill>
+                  <a:srgbClr val="000000"/>
+                </a:solidFill>
+                <a:latin typeface="Consolas" panose="020B0609020204030204" pitchFamily="49" charset="0"/>
+              </a:rPr>
+              <a:t>(</a:t>
+            </a:r>
+            <a:r>
+              <a:rPr lang="en-US" sz="2800" dirty="0">
+                <a:solidFill>
+                  <a:srgbClr val="A31515"/>
+                </a:solidFill>
+                <a:latin typeface="Consolas" panose="020B0609020204030204" pitchFamily="49" charset="0"/>
+              </a:rPr>
+              <a:t>"%d"</a:t>
+            </a:r>
+            <a:r>
+              <a:rPr lang="en-US" sz="2800" dirty="0">
+                <a:solidFill>
+                  <a:srgbClr val="000000"/>
+                </a:solidFill>
+                <a:latin typeface="Consolas" panose="020B0609020204030204" pitchFamily="49" charset="0"/>
+              </a:rPr>
+              <a:t>, var);</a:t>
+            </a:r>
+          </a:p>
+          <a:p>
+            <a:r>
+              <a:rPr lang="en-US" sz="2800" dirty="0">
+                <a:solidFill>
+                  <a:srgbClr val="000000"/>
+                </a:solidFill>
+                <a:latin typeface="Consolas" panose="020B0609020204030204" pitchFamily="49" charset="0"/>
+              </a:rPr>
+              <a:t>}</a:t>
+            </a:r>
+          </a:p>
+          <a:p>
+            <a:r>
+              <a:rPr lang="en-US" sz="2800" dirty="0">
+                <a:solidFill>
+                  <a:srgbClr val="000000"/>
+                </a:solidFill>
+                <a:latin typeface="Consolas" panose="020B0609020204030204" pitchFamily="49" charset="0"/>
+              </a:rPr>
+              <a:t>b();</a:t>
+            </a:r>
+          </a:p>
+          <a:p>
+            <a:br>
+              <a:rPr lang="en-US" sz="2800" dirty="0">
+                <a:solidFill>
+                  <a:srgbClr val="000000"/>
+                </a:solidFill>
+                <a:latin typeface="Consolas" panose="020B0609020204030204" pitchFamily="49" charset="0"/>
+              </a:rPr>
+            </a:br>
+            <a:endParaRPr lang="en-US" sz="2800" dirty="0">
+              <a:solidFill>
+                <a:srgbClr val="000000"/>
+              </a:solidFill>
+              <a:latin typeface="Consolas" panose="020B0609020204030204" pitchFamily="49" charset="0"/>
+            </a:endParaRPr>
+          </a:p>
+        </p:txBody>
+      </p:sp>
+    </p:spTree>
+    <p:extLst>
+      <p:ext uri="{BB962C8B-B14F-4D97-AF65-F5344CB8AC3E}">
+        <p14:creationId xmlns:p14="http://schemas.microsoft.com/office/powerpoint/2010/main" val="4064674354"/>
       </p:ext>
     </p:extLst>
   </p:cSld>
@@ -8465,7 +8299,7 @@
         <p:spPr>
           <a:xfrm>
             <a:off x="914400" y="1512193"/>
-            <a:ext cx="8225518" cy="3108543"/>
+            <a:ext cx="10985046" cy="3970318"/>
           </a:xfrm>
           <a:prstGeom prst="rect">
             <a:avLst/>
@@ -8491,21 +8325,52 @@
             <a:r>
               <a:rPr lang="en-US" sz="2800" dirty="0">
                 <a:solidFill>
+                  <a:srgbClr val="000000"/>
+                </a:solidFill>
+                <a:latin typeface="Consolas" panose="020B0609020204030204" pitchFamily="49" charset="0"/>
+              </a:rPr>
+              <a:t>{</a:t>
+            </a:r>
+          </a:p>
+          <a:p>
+            <a:r>
+              <a:rPr lang="en-US" sz="2800" dirty="0">
+                <a:solidFill>
                   <a:srgbClr val="0000FF"/>
                 </a:solidFill>
                 <a:latin typeface="Consolas" panose="020B0609020204030204" pitchFamily="49" charset="0"/>
               </a:rPr>
-              <a:t>if</a:t>
-            </a:r>
-            <a:r>
-              <a:rPr lang="en-US" sz="2800" dirty="0">
-                <a:solidFill>
-                  <a:srgbClr val="000000"/>
-                </a:solidFill>
-                <a:latin typeface="Consolas" panose="020B0609020204030204" pitchFamily="49" charset="0"/>
-              </a:rPr>
-              <a:t> (</a:t>
-            </a:r>
+              <a:t>    int</a:t>
+            </a:r>
+            <a:r>
+              <a:rPr lang="en-US" sz="2800" dirty="0">
+                <a:solidFill>
+                  <a:srgbClr val="000000"/>
+                </a:solidFill>
+                <a:latin typeface="Consolas" panose="020B0609020204030204" pitchFamily="49" charset="0"/>
+              </a:rPr>
+              <a:t> var = </a:t>
+            </a:r>
+            <a:r>
+              <a:rPr lang="en-US" sz="2800" dirty="0" err="1">
+                <a:solidFill>
+                  <a:srgbClr val="000000"/>
+                </a:solidFill>
+                <a:latin typeface="Consolas" panose="020B0609020204030204" pitchFamily="49" charset="0"/>
+              </a:rPr>
+              <a:t>get_val</a:t>
+            </a:r>
+            <a:r>
+              <a:rPr lang="en-US" sz="2800" dirty="0">
+                <a:solidFill>
+                  <a:srgbClr val="000000"/>
+                </a:solidFill>
+                <a:latin typeface="Consolas" panose="020B0609020204030204" pitchFamily="49" charset="0"/>
+              </a:rPr>
+              <a:t>();</a:t>
+            </a:r>
+          </a:p>
+          <a:p>
             <a:r>
               <a:rPr lang="en-US" sz="2800" dirty="0">
                 <a:solidFill>
@@ -8513,16 +8378,45 @@
                 </a:solidFill>
                 <a:latin typeface="Consolas" panose="020B0609020204030204" pitchFamily="49" charset="0"/>
               </a:rPr>
-              <a:t>int</a:t>
-            </a:r>
-            <a:r>
-              <a:rPr lang="en-US" sz="2800" dirty="0">
-                <a:solidFill>
-                  <a:srgbClr val="000000"/>
-                </a:solidFill>
-                <a:latin typeface="Consolas" panose="020B0609020204030204" pitchFamily="49" charset="0"/>
-              </a:rPr>
-              <a:t> var = </a:t>
+              <a:t>    if</a:t>
+            </a:r>
+            <a:r>
+              <a:rPr lang="en-US" sz="2800" dirty="0">
+                <a:solidFill>
+                  <a:srgbClr val="000000"/>
+                </a:solidFill>
+                <a:latin typeface="Consolas" panose="020B0609020204030204" pitchFamily="49" charset="0"/>
+              </a:rPr>
+              <a:t> (var &lt; </a:t>
+            </a:r>
+            <a:r>
+              <a:rPr lang="en-US" sz="2800" dirty="0">
+                <a:solidFill>
+                  <a:srgbClr val="09885A"/>
+                </a:solidFill>
+                <a:latin typeface="Consolas" panose="020B0609020204030204" pitchFamily="49" charset="0"/>
+              </a:rPr>
+              <a:t>42</a:t>
+            </a:r>
+            <a:r>
+              <a:rPr lang="en-US" sz="2800" dirty="0">
+                <a:solidFill>
+                  <a:srgbClr val="000000"/>
+                </a:solidFill>
+                <a:latin typeface="Consolas" panose="020B0609020204030204" pitchFamily="49" charset="0"/>
+              </a:rPr>
+              <a:t>) {</a:t>
+            </a:r>
+          </a:p>
+          <a:p>
+            <a:r>
+              <a:rPr lang="en-US" sz="2800" dirty="0">
+                <a:solidFill>
+                  <a:srgbClr val="000000"/>
+                </a:solidFill>
+                <a:latin typeface="Consolas" panose="020B0609020204030204" pitchFamily="49" charset="0"/>
+              </a:rPr>
+              <a:t>        </a:t>
             </a:r>
             <a:r>
               <a:rPr lang="en-US" sz="2800" dirty="0" err="1">
@@ -8531,53 +8425,6 @@
                 </a:solidFill>
                 <a:latin typeface="Consolas" panose="020B0609020204030204" pitchFamily="49" charset="0"/>
               </a:rPr>
-              <a:t>get_val</a:t>
-            </a:r>
-            <a:r>
-              <a:rPr lang="en-US" sz="2800" dirty="0">
-                <a:solidFill>
-                  <a:srgbClr val="000000"/>
-                </a:solidFill>
-                <a:latin typeface="Consolas" panose="020B0609020204030204" pitchFamily="49" charset="0"/>
-              </a:rPr>
-              <a:t>(); var &lt; </a:t>
-            </a:r>
-            <a:r>
-              <a:rPr lang="en-US" sz="2800" dirty="0">
-                <a:solidFill>
-                  <a:srgbClr val="09885A"/>
-                </a:solidFill>
-                <a:latin typeface="Consolas" panose="020B0609020204030204" pitchFamily="49" charset="0"/>
-              </a:rPr>
-              <a:t>42</a:t>
-            </a:r>
-            <a:r>
-              <a:rPr lang="en-US" sz="2800" dirty="0">
-                <a:solidFill>
-                  <a:srgbClr val="000000"/>
-                </a:solidFill>
-                <a:latin typeface="Consolas" panose="020B0609020204030204" pitchFamily="49" charset="0"/>
-              </a:rPr>
-              <a:t>) {</a:t>
-            </a:r>
-          </a:p>
-          <a:p>
-            <a:r>
-              <a:rPr lang="en-US" sz="2800" dirty="0">
-                <a:solidFill>
-                  <a:srgbClr val="000000"/>
-                </a:solidFill>
-                <a:latin typeface="Consolas" panose="020B0609020204030204" pitchFamily="49" charset="0"/>
-              </a:rPr>
-              <a:t>    </a:t>
-            </a:r>
-            <a:r>
-              <a:rPr lang="en-US" sz="2800" dirty="0" err="1">
-                <a:solidFill>
-                  <a:srgbClr val="000000"/>
-                </a:solidFill>
-                <a:latin typeface="Consolas" panose="020B0609020204030204" pitchFamily="49" charset="0"/>
-              </a:rPr>
               <a:t>printf</a:t>
             </a:r>
             <a:r>
@@ -8616,29 +8463,19 @@
                 </a:solidFill>
                 <a:latin typeface="Consolas" panose="020B0609020204030204" pitchFamily="49" charset="0"/>
               </a:rPr>
-              <a:t>}</a:t>
-            </a:r>
-          </a:p>
-          <a:p>
-            <a:r>
-              <a:rPr lang="en-US" sz="2800" dirty="0">
-                <a:solidFill>
-                  <a:srgbClr val="000000"/>
-                </a:solidFill>
-                <a:latin typeface="Consolas" panose="020B0609020204030204" pitchFamily="49" charset="0"/>
-              </a:rPr>
-              <a:t>b();</a:t>
-            </a:r>
-          </a:p>
-          <a:p>
-            <a:br>
-              <a:rPr lang="en-US" sz="2800" dirty="0">
-                <a:solidFill>
-                  <a:srgbClr val="000000"/>
-                </a:solidFill>
-                <a:latin typeface="Consolas" panose="020B0609020204030204" pitchFamily="49" charset="0"/>
-              </a:rPr>
-            </a:br>
+              <a:t>    }</a:t>
+            </a:r>
+          </a:p>
+          <a:p>
+            <a:r>
+              <a:rPr lang="en-US" sz="2800" dirty="0">
+                <a:solidFill>
+                  <a:srgbClr val="008000"/>
+                </a:solidFill>
+                <a:latin typeface="Consolas" panose="020B0609020204030204" pitchFamily="49" charset="0"/>
+              </a:rPr>
+              <a:t>    // var doesn't 'escape' into the enclosing scope</a:t>
+            </a:r>
             <a:endParaRPr lang="en-US" sz="2800" dirty="0">
               <a:solidFill>
                 <a:srgbClr val="000000"/>
@@ -8646,12 +8483,34 @@
               <a:latin typeface="Consolas" panose="020B0609020204030204" pitchFamily="49" charset="0"/>
             </a:endParaRPr>
           </a:p>
+          <a:p>
+            <a:r>
+              <a:rPr lang="en-US" sz="2800" dirty="0">
+                <a:solidFill>
+                  <a:srgbClr val="000000"/>
+                </a:solidFill>
+                <a:latin typeface="Consolas" panose="020B0609020204030204" pitchFamily="49" charset="0"/>
+              </a:rPr>
+              <a:t>}</a:t>
+            </a:r>
+          </a:p>
+          <a:p>
+            <a:r>
+              <a:rPr lang="en-US" sz="2800" dirty="0">
+                <a:solidFill>
+                  <a:srgbClr val="000000"/>
+                </a:solidFill>
+                <a:latin typeface="Consolas" panose="020B0609020204030204" pitchFamily="49" charset="0"/>
+              </a:rPr>
+              <a:t>b();</a:t>
+            </a:r>
+          </a:p>
         </p:txBody>
       </p:sp>
     </p:spTree>
     <p:extLst>
       <p:ext uri="{BB962C8B-B14F-4D97-AF65-F5344CB8AC3E}">
-        <p14:creationId xmlns:p14="http://schemas.microsoft.com/office/powerpoint/2010/main" val="4064674354"/>
+        <p14:creationId xmlns:p14="http://schemas.microsoft.com/office/powerpoint/2010/main" val="3552121767"/>
       </p:ext>
     </p:extLst>
   </p:cSld>
@@ -8914,7 +8773,7 @@
           <p:cNvPr id="2" name="Title 1">
             <a:extLst>
               <a:ext uri="{FF2B5EF4-FFF2-40B4-BE49-F238E27FC236}">
-                <a16:creationId xmlns:a16="http://schemas.microsoft.com/office/drawing/2014/main" id="{577A0844-EF70-4198-8372-7FBE76AE2363}"/>
+                <a16:creationId xmlns:a16="http://schemas.microsoft.com/office/drawing/2014/main" id="{C4F5ECCC-8ADE-4062-A9D3-533C7C16A7D4}"/>
               </a:ext>
             </a:extLst>
           </p:cNvPr>
@@ -8932,7 +8791,7 @@
           <a:p>
             <a:r>
               <a:rPr lang="en-US" dirty="0"/>
-              <a:t>Selection Statements with Initializers	</a:t>
+              <a:t>Selection Statements with Initializers</a:t>
             </a:r>
           </a:p>
         </p:txBody>
@@ -8942,7 +8801,7 @@
           <p:cNvPr id="4" name="Rectangle 3">
             <a:extLst>
               <a:ext uri="{FF2B5EF4-FFF2-40B4-BE49-F238E27FC236}">
-                <a16:creationId xmlns:a16="http://schemas.microsoft.com/office/drawing/2014/main" id="{34B4AE5B-D447-4CD4-B670-2550611E081D}"/>
+                <a16:creationId xmlns:a16="http://schemas.microsoft.com/office/drawing/2014/main" id="{EFA82D0C-8ED6-4CD2-B0A9-51219B0D552C}"/>
               </a:ext>
             </a:extLst>
           </p:cNvPr>
@@ -8951,8 +8810,8 @@
         </p:nvSpPr>
         <p:spPr>
           <a:xfrm>
-            <a:off x="914400" y="1512193"/>
-            <a:ext cx="10985046" cy="3970318"/>
+            <a:off x="315685" y="1690688"/>
+            <a:ext cx="11560629" cy="1815882"/>
           </a:xfrm>
           <a:prstGeom prst="rect">
             <a:avLst/>
@@ -8967,22 +8826,11 @@
             <a:r>
               <a:rPr lang="en-US" sz="2800" dirty="0">
                 <a:solidFill>
-                  <a:srgbClr val="000000"/>
-                </a:solidFill>
-                <a:latin typeface="Consolas" panose="020B0609020204030204" pitchFamily="49" charset="0"/>
-              </a:rPr>
-              <a:t>a();</a:t>
-            </a:r>
-          </a:p>
-          <a:p>
-            <a:r>
-              <a:rPr lang="en-US" sz="2800" dirty="0">
-                <a:solidFill>
-                  <a:srgbClr val="000000"/>
-                </a:solidFill>
-                <a:latin typeface="Consolas" panose="020B0609020204030204" pitchFamily="49" charset="0"/>
-              </a:rPr>
-              <a:t>{</a:t>
+                  <a:srgbClr val="008000"/>
+                </a:solidFill>
+                <a:latin typeface="Consolas" panose="020B0609020204030204" pitchFamily="49" charset="0"/>
+              </a:rPr>
+              <a:t>// example from the compiler</a:t>
             </a:r>
           </a:p>
           <a:p>
@@ -8993,16 +8841,52 @@
                 </a:solidFill>
                 <a:latin typeface="Consolas" panose="020B0609020204030204" pitchFamily="49" charset="0"/>
               </a:rPr>
-              <a:t>    int</a:t>
-            </a:r>
-            <a:r>
-              <a:rPr lang="en-US" sz="2800" dirty="0">
-                <a:solidFill>
-                  <a:srgbClr val="000000"/>
-                </a:solidFill>
-                <a:latin typeface="Consolas" panose="020B0609020204030204" pitchFamily="49" charset="0"/>
-              </a:rPr>
-              <a:t> var = </a:t>
+              <a:t>if</a:t>
+            </a:r>
+            <a:r>
+              <a:rPr lang="en-US" sz="2800" dirty="0">
+                <a:solidFill>
+                  <a:srgbClr val="000000"/>
+                </a:solidFill>
+                <a:latin typeface="Consolas" panose="020B0609020204030204" pitchFamily="49" charset="0"/>
+              </a:rPr>
+              <a:t> (</a:t>
+            </a:r>
+            <a:r>
+              <a:rPr lang="en-US" sz="2800" dirty="0">
+                <a:solidFill>
+                  <a:srgbClr val="0000FF"/>
+                </a:solidFill>
+                <a:latin typeface="Consolas" panose="020B0609020204030204" pitchFamily="49" charset="0"/>
+              </a:rPr>
+              <a:t>const</a:t>
+            </a:r>
+            <a:r>
+              <a:rPr lang="en-US" sz="2800" dirty="0">
+                <a:solidFill>
+                  <a:srgbClr val="000000"/>
+                </a:solidFill>
+                <a:latin typeface="Consolas" panose="020B0609020204030204" pitchFamily="49" charset="0"/>
+              </a:rPr>
+              <a:t> </a:t>
+            </a:r>
+            <a:r>
+              <a:rPr lang="en-US" sz="2800" dirty="0">
+                <a:solidFill>
+                  <a:srgbClr val="0000FF"/>
+                </a:solidFill>
+                <a:latin typeface="Consolas" panose="020B0609020204030204" pitchFamily="49" charset="0"/>
+              </a:rPr>
+              <a:t>auto</a:t>
+            </a:r>
+            <a:r>
+              <a:rPr lang="en-US" sz="2800" dirty="0">
+                <a:solidFill>
+                  <a:srgbClr val="000000"/>
+                </a:solidFill>
+                <a:latin typeface="Consolas" panose="020B0609020204030204" pitchFamily="49" charset="0"/>
+              </a:rPr>
+              <a:t> symbol = </a:t>
             </a:r>
             <a:r>
               <a:rPr lang="en-US" sz="2800" dirty="0" err="1">
@@ -9011,65 +8895,38 @@
                 </a:solidFill>
                 <a:latin typeface="Consolas" panose="020B0609020204030204" pitchFamily="49" charset="0"/>
               </a:rPr>
-              <a:t>get_val</a:t>
-            </a:r>
-            <a:r>
-              <a:rPr lang="en-US" sz="2800" dirty="0">
-                <a:solidFill>
-                  <a:srgbClr val="000000"/>
-                </a:solidFill>
-                <a:latin typeface="Consolas" panose="020B0609020204030204" pitchFamily="49" charset="0"/>
-              </a:rPr>
-              <a:t>();</a:t>
-            </a:r>
-          </a:p>
-          <a:p>
-            <a:r>
-              <a:rPr lang="en-US" sz="2800" dirty="0">
-                <a:solidFill>
-                  <a:srgbClr val="0000FF"/>
-                </a:solidFill>
-                <a:latin typeface="Consolas" panose="020B0609020204030204" pitchFamily="49" charset="0"/>
-              </a:rPr>
-              <a:t>    if</a:t>
-            </a:r>
-            <a:r>
-              <a:rPr lang="en-US" sz="2800" dirty="0">
-                <a:solidFill>
-                  <a:srgbClr val="000000"/>
-                </a:solidFill>
-                <a:latin typeface="Consolas" panose="020B0609020204030204" pitchFamily="49" charset="0"/>
-              </a:rPr>
-              <a:t> (var &lt; </a:t>
-            </a:r>
-            <a:r>
-              <a:rPr lang="en-US" sz="2800" dirty="0">
-                <a:solidFill>
-                  <a:srgbClr val="09885A"/>
-                </a:solidFill>
-                <a:latin typeface="Consolas" panose="020B0609020204030204" pitchFamily="49" charset="0"/>
-              </a:rPr>
-              <a:t>42</a:t>
-            </a:r>
-            <a:r>
-              <a:rPr lang="en-US" sz="2800" dirty="0">
-                <a:solidFill>
-                  <a:srgbClr val="000000"/>
-                </a:solidFill>
-                <a:latin typeface="Consolas" panose="020B0609020204030204" pitchFamily="49" charset="0"/>
-              </a:rPr>
-              <a:t>) {</a:t>
-            </a:r>
-          </a:p>
-          <a:p>
-            <a:r>
-              <a:rPr lang="en-US" sz="2800" dirty="0">
-                <a:solidFill>
-                  <a:srgbClr val="000000"/>
-                </a:solidFill>
-                <a:latin typeface="Consolas" panose="020B0609020204030204" pitchFamily="49" charset="0"/>
-              </a:rPr>
-              <a:t>        </a:t>
+              <a:t>thisArg</a:t>
+            </a:r>
+            <a:r>
+              <a:rPr lang="en-US" sz="2800" dirty="0">
+                <a:solidFill>
+                  <a:srgbClr val="000000"/>
+                </a:solidFill>
+                <a:latin typeface="Consolas" panose="020B0609020204030204" pitchFamily="49" charset="0"/>
+              </a:rPr>
+              <a:t>-&gt;Symbol(); symbol-&gt;Kind()</a:t>
+            </a:r>
+          </a:p>
+          <a:p>
+            <a:r>
+              <a:rPr lang="en-US" sz="2800" dirty="0">
+                <a:solidFill>
+                  <a:srgbClr val="000000"/>
+                </a:solidFill>
+                <a:latin typeface="Consolas" panose="020B0609020204030204" pitchFamily="49" charset="0"/>
+              </a:rPr>
+              <a:t>        == SY_FORMALPARAMETER)</a:t>
+            </a:r>
+          </a:p>
+          <a:p>
+            <a:r>
+              <a:rPr lang="en-US" sz="2800" dirty="0">
+                <a:solidFill>
+                  <a:srgbClr val="000000"/>
+                </a:solidFill>
+                <a:latin typeface="Consolas" panose="020B0609020204030204" pitchFamily="49" charset="0"/>
+              </a:rPr>
+              <a:t>    </a:t>
             </a:r>
             <a:r>
               <a:rPr lang="en-US" sz="2800" dirty="0" err="1">
@@ -9078,92 +8935,49 @@
                 </a:solidFill>
                 <a:latin typeface="Consolas" panose="020B0609020204030204" pitchFamily="49" charset="0"/>
               </a:rPr>
-              <a:t>printf</a:t>
-            </a:r>
-            <a:r>
-              <a:rPr lang="en-US" sz="2800" dirty="0">
-                <a:solidFill>
-                  <a:srgbClr val="000000"/>
-                </a:solidFill>
-                <a:latin typeface="Consolas" panose="020B0609020204030204" pitchFamily="49" charset="0"/>
-              </a:rPr>
-              <a:t>(</a:t>
-            </a:r>
-            <a:r>
-              <a:rPr lang="en-US" sz="2800" dirty="0">
-                <a:solidFill>
-                  <a:srgbClr val="A31515"/>
-                </a:solidFill>
-                <a:latin typeface="Consolas" panose="020B0609020204030204" pitchFamily="49" charset="0"/>
-              </a:rPr>
-              <a:t>"%d"</a:t>
-            </a:r>
-            <a:r>
-              <a:rPr lang="en-US" sz="2800" dirty="0">
-                <a:solidFill>
-                  <a:srgbClr val="000000"/>
-                </a:solidFill>
-                <a:latin typeface="Consolas" panose="020B0609020204030204" pitchFamily="49" charset="0"/>
-              </a:rPr>
-              <a:t>, var);</a:t>
-            </a:r>
-          </a:p>
-          <a:p>
-            <a:r>
-              <a:rPr lang="en-US" sz="2800" dirty="0">
-                <a:solidFill>
-                  <a:srgbClr val="000000"/>
-                </a:solidFill>
-                <a:latin typeface="Consolas" panose="020B0609020204030204" pitchFamily="49" charset="0"/>
-              </a:rPr>
-              <a:t>    }</a:t>
-            </a:r>
-          </a:p>
-          <a:p>
-            <a:r>
-              <a:rPr lang="en-US" sz="2800" dirty="0">
-                <a:solidFill>
-                  <a:srgbClr val="008000"/>
-                </a:solidFill>
-                <a:latin typeface="Consolas" panose="020B0609020204030204" pitchFamily="49" charset="0"/>
-              </a:rPr>
-              <a:t>    // var doesn't 'escape' into the enclosing scope</a:t>
-            </a:r>
-            <a:endParaRPr lang="en-US" sz="2800" dirty="0">
+              <a:t>varToDestroy</a:t>
+            </a:r>
+            <a:r>
+              <a:rPr lang="en-US" sz="2800" dirty="0">
+                <a:solidFill>
+                  <a:srgbClr val="000000"/>
+                </a:solidFill>
+                <a:latin typeface="Consolas" panose="020B0609020204030204" pitchFamily="49" charset="0"/>
+              </a:rPr>
+              <a:t> = </a:t>
+            </a:r>
+            <a:r>
+              <a:rPr lang="en-US" sz="2800" dirty="0" err="1">
+                <a:solidFill>
+                  <a:srgbClr val="000000"/>
+                </a:solidFill>
+                <a:latin typeface="Consolas" panose="020B0609020204030204" pitchFamily="49" charset="0"/>
+              </a:rPr>
+              <a:t>FindVar</a:t>
+            </a:r>
+            <a:r>
+              <a:rPr lang="en-US" sz="2800" dirty="0">
+                <a:solidFill>
+                  <a:srgbClr val="000000"/>
+                </a:solidFill>
+                <a:latin typeface="Consolas" panose="020B0609020204030204" pitchFamily="49" charset="0"/>
+              </a:rPr>
+              <a:t>(symbol);</a:t>
+            </a:r>
+            <a:endParaRPr lang="en-US" sz="2800" b="0" dirty="0">
               <a:solidFill>
                 <a:srgbClr val="000000"/>
               </a:solidFill>
+              <a:effectLst/>
               <a:latin typeface="Consolas" panose="020B0609020204030204" pitchFamily="49" charset="0"/>
             </a:endParaRPr>
-          </a:p>
-          <a:p>
-            <a:r>
-              <a:rPr lang="en-US" sz="2800" dirty="0">
-                <a:solidFill>
-                  <a:srgbClr val="000000"/>
-                </a:solidFill>
-                <a:latin typeface="Consolas" panose="020B0609020204030204" pitchFamily="49" charset="0"/>
-              </a:rPr>
-              <a:t>}</a:t>
-            </a:r>
-          </a:p>
-          <a:p>
-            <a:r>
-              <a:rPr lang="en-US" sz="2800" dirty="0">
-                <a:solidFill>
-                  <a:srgbClr val="000000"/>
-                </a:solidFill>
-                <a:latin typeface="Consolas" panose="020B0609020204030204" pitchFamily="49" charset="0"/>
-              </a:rPr>
-              <a:t>b();</a:t>
-            </a:r>
           </a:p>
         </p:txBody>
       </p:sp>
     </p:spTree>
     <p:extLst>
       <p:ext uri="{BB962C8B-B14F-4D97-AF65-F5344CB8AC3E}">
-        <p14:creationId xmlns:p14="http://schemas.microsoft.com/office/powerpoint/2010/main" val="3552121767"/>
+        <p14:creationId xmlns:p14="http://schemas.microsoft.com/office/powerpoint/2010/main" val="2342662362"/>
       </p:ext>
     </p:extLst>
   </p:cSld>
@@ -9195,7 +9009,7 @@
           <p:cNvPr id="2" name="Title 1">
             <a:extLst>
               <a:ext uri="{FF2B5EF4-FFF2-40B4-BE49-F238E27FC236}">
-                <a16:creationId xmlns:a16="http://schemas.microsoft.com/office/drawing/2014/main" id="{C4F5ECCC-8ADE-4062-A9D3-533C7C16A7D4}"/>
+                <a16:creationId xmlns:a16="http://schemas.microsoft.com/office/drawing/2014/main" id="{555DAEA1-FD8B-4362-8F66-693DC0BD7F3B}"/>
               </a:ext>
             </a:extLst>
           </p:cNvPr>
@@ -9223,7 +9037,7 @@
           <p:cNvPr id="4" name="Rectangle 3">
             <a:extLst>
               <a:ext uri="{FF2B5EF4-FFF2-40B4-BE49-F238E27FC236}">
-                <a16:creationId xmlns:a16="http://schemas.microsoft.com/office/drawing/2014/main" id="{EFA82D0C-8ED6-4CD2-B0A9-51219B0D552C}"/>
+                <a16:creationId xmlns:a16="http://schemas.microsoft.com/office/drawing/2014/main" id="{2B5FBC35-7A60-4476-A514-4679F2B792AE}"/>
               </a:ext>
             </a:extLst>
           </p:cNvPr>
@@ -9232,8 +9046,8 @@
         </p:nvSpPr>
         <p:spPr>
           <a:xfrm>
-            <a:off x="315685" y="1690688"/>
-            <a:ext cx="11560629" cy="1815882"/>
+            <a:off x="575403" y="1521027"/>
+            <a:ext cx="11070931" cy="2677656"/>
           </a:xfrm>
           <a:prstGeom prst="rect">
             <a:avLst/>
@@ -9248,14 +9062,30 @@
             <a:r>
               <a:rPr lang="en-US" sz="2800" dirty="0">
                 <a:solidFill>
-                  <a:srgbClr val="008000"/>
-                </a:solidFill>
-                <a:latin typeface="Consolas" panose="020B0609020204030204" pitchFamily="49" charset="0"/>
-              </a:rPr>
-              <a:t>// example from the compiler</a:t>
-            </a:r>
-          </a:p>
-          <a:p>
+                  <a:srgbClr val="000000"/>
+                </a:solidFill>
+                <a:latin typeface="Consolas" panose="020B0609020204030204" pitchFamily="49" charset="0"/>
+              </a:rPr>
+              <a:t>std::</a:t>
+            </a:r>
+            <a:r>
+              <a:rPr lang="en-US" sz="2800" dirty="0" err="1">
+                <a:solidFill>
+                  <a:srgbClr val="000000"/>
+                </a:solidFill>
+                <a:latin typeface="Consolas" panose="020B0609020204030204" pitchFamily="49" charset="0"/>
+              </a:rPr>
+              <a:t>unique_ptr</a:t>
+            </a:r>
+            <a:r>
+              <a:rPr lang="en-US" sz="2800" dirty="0">
+                <a:solidFill>
+                  <a:srgbClr val="000000"/>
+                </a:solidFill>
+                <a:latin typeface="Consolas" panose="020B0609020204030204" pitchFamily="49" charset="0"/>
+              </a:rPr>
+              <a:t>&lt;</a:t>
+            </a:r>
             <a:r>
               <a:rPr lang="en-US" sz="2800" dirty="0">
                 <a:solidFill>
@@ -9263,6 +9093,210 @@
                 </a:solidFill>
                 <a:latin typeface="Consolas" panose="020B0609020204030204" pitchFamily="49" charset="0"/>
               </a:rPr>
+              <a:t>int</a:t>
+            </a:r>
+            <a:r>
+              <a:rPr lang="en-US" sz="2800" dirty="0">
+                <a:solidFill>
+                  <a:srgbClr val="000000"/>
+                </a:solidFill>
+                <a:latin typeface="Consolas" panose="020B0609020204030204" pitchFamily="49" charset="0"/>
+              </a:rPr>
+              <a:t>&gt; </a:t>
+            </a:r>
+            <a:r>
+              <a:rPr lang="en-US" sz="2800" dirty="0" err="1">
+                <a:solidFill>
+                  <a:srgbClr val="000000"/>
+                </a:solidFill>
+                <a:latin typeface="Consolas" panose="020B0609020204030204" pitchFamily="49" charset="0"/>
+              </a:rPr>
+              <a:t>get_value</a:t>
+            </a:r>
+            <a:r>
+              <a:rPr lang="en-US" sz="2800" dirty="0">
+                <a:solidFill>
+                  <a:srgbClr val="000000"/>
+                </a:solidFill>
+                <a:latin typeface="Consolas" panose="020B0609020204030204" pitchFamily="49" charset="0"/>
+              </a:rPr>
+              <a:t>() {</a:t>
+            </a:r>
+          </a:p>
+          <a:p>
+            <a:r>
+              <a:rPr lang="en-US" sz="2800" dirty="0" err="1">
+                <a:solidFill>
+                  <a:srgbClr val="0000FF"/>
+                </a:solidFill>
+                <a:latin typeface="Consolas" panose="020B0609020204030204" pitchFamily="49" charset="0"/>
+              </a:rPr>
+              <a:t>constexpr</a:t>
+            </a:r>
+            <a:r>
+              <a:rPr lang="en-US" sz="2800" dirty="0">
+                <a:solidFill>
+                  <a:srgbClr val="000000"/>
+                </a:solidFill>
+                <a:latin typeface="Consolas" panose="020B0609020204030204" pitchFamily="49" charset="0"/>
+              </a:rPr>
+              <a:t> </a:t>
+            </a:r>
+            <a:r>
+              <a:rPr lang="en-US" sz="2800" dirty="0">
+                <a:solidFill>
+                  <a:srgbClr val="0000FF"/>
+                </a:solidFill>
+                <a:latin typeface="Consolas" panose="020B0609020204030204" pitchFamily="49" charset="0"/>
+              </a:rPr>
+              <a:t>auto</a:t>
+            </a:r>
+            <a:r>
+              <a:rPr lang="en-US" sz="2800" dirty="0">
+                <a:solidFill>
+                  <a:srgbClr val="000000"/>
+                </a:solidFill>
+                <a:latin typeface="Consolas" panose="020B0609020204030204" pitchFamily="49" charset="0"/>
+              </a:rPr>
+              <a:t> </a:t>
+            </a:r>
+            <a:r>
+              <a:rPr lang="en-US" sz="2800" dirty="0" err="1">
+                <a:solidFill>
+                  <a:srgbClr val="000000"/>
+                </a:solidFill>
+                <a:latin typeface="Consolas" panose="020B0609020204030204" pitchFamily="49" charset="0"/>
+              </a:rPr>
+              <a:t>maxInt</a:t>
+            </a:r>
+            <a:r>
+              <a:rPr lang="en-US" sz="2800" dirty="0">
+                <a:solidFill>
+                  <a:srgbClr val="000000"/>
+                </a:solidFill>
+                <a:latin typeface="Consolas" panose="020B0609020204030204" pitchFamily="49" charset="0"/>
+              </a:rPr>
+              <a:t> = </a:t>
+            </a:r>
+            <a:r>
+              <a:rPr lang="en-US" sz="2800" dirty="0" err="1">
+                <a:solidFill>
+                  <a:srgbClr val="0000FF"/>
+                </a:solidFill>
+                <a:latin typeface="Consolas" panose="020B0609020204030204" pitchFamily="49" charset="0"/>
+              </a:rPr>
+              <a:t>static_cast</a:t>
+            </a:r>
+            <a:r>
+              <a:rPr lang="en-US" sz="2800" dirty="0">
+                <a:solidFill>
+                  <a:srgbClr val="000000"/>
+                </a:solidFill>
+                <a:latin typeface="Consolas" panose="020B0609020204030204" pitchFamily="49" charset="0"/>
+              </a:rPr>
+              <a:t>&lt;</a:t>
+            </a:r>
+            <a:r>
+              <a:rPr lang="en-US" sz="2800" dirty="0">
+                <a:solidFill>
+                  <a:srgbClr val="0000FF"/>
+                </a:solidFill>
+                <a:latin typeface="Consolas" panose="020B0609020204030204" pitchFamily="49" charset="0"/>
+              </a:rPr>
+              <a:t>unsigned</a:t>
+            </a:r>
+            <a:r>
+              <a:rPr lang="en-US" sz="2800" dirty="0">
+                <a:solidFill>
+                  <a:srgbClr val="000000"/>
+                </a:solidFill>
+                <a:latin typeface="Consolas" panose="020B0609020204030204" pitchFamily="49" charset="0"/>
+              </a:rPr>
+              <a:t>&gt;(INT_MAX);</a:t>
+            </a:r>
+          </a:p>
+          <a:p>
+            <a:r>
+              <a:rPr lang="en-US" sz="2800" dirty="0">
+                <a:solidFill>
+                  <a:srgbClr val="0000FF"/>
+                </a:solidFill>
+                <a:latin typeface="Consolas" panose="020B0609020204030204" pitchFamily="49" charset="0"/>
+              </a:rPr>
+              <a:t>const</a:t>
+            </a:r>
+            <a:r>
+              <a:rPr lang="en-US" sz="2800" dirty="0">
+                <a:solidFill>
+                  <a:srgbClr val="000000"/>
+                </a:solidFill>
+                <a:latin typeface="Consolas" panose="020B0609020204030204" pitchFamily="49" charset="0"/>
+              </a:rPr>
+              <a:t> </a:t>
+            </a:r>
+            <a:r>
+              <a:rPr lang="en-US" sz="2800" dirty="0">
+                <a:solidFill>
+                  <a:srgbClr val="0000FF"/>
+                </a:solidFill>
+                <a:latin typeface="Consolas" panose="020B0609020204030204" pitchFamily="49" charset="0"/>
+              </a:rPr>
+              <a:t>unsigned</a:t>
+            </a:r>
+            <a:r>
+              <a:rPr lang="en-US" sz="2800" dirty="0">
+                <a:solidFill>
+                  <a:srgbClr val="000000"/>
+                </a:solidFill>
+                <a:latin typeface="Consolas" panose="020B0609020204030204" pitchFamily="49" charset="0"/>
+              </a:rPr>
+              <a:t> </a:t>
+            </a:r>
+            <a:r>
+              <a:rPr lang="en-US" sz="2800" dirty="0" err="1">
+                <a:solidFill>
+                  <a:srgbClr val="000000"/>
+                </a:solidFill>
+                <a:latin typeface="Consolas" panose="020B0609020204030204" pitchFamily="49" charset="0"/>
+              </a:rPr>
+              <a:t>val</a:t>
+            </a:r>
+            <a:r>
+              <a:rPr lang="en-US" sz="2800" dirty="0">
+                <a:solidFill>
+                  <a:srgbClr val="000000"/>
+                </a:solidFill>
+                <a:latin typeface="Consolas" panose="020B0609020204030204" pitchFamily="49" charset="0"/>
+              </a:rPr>
+              <a:t> = std::</a:t>
+            </a:r>
+            <a:r>
+              <a:rPr lang="en-US" sz="2800" dirty="0" err="1">
+                <a:solidFill>
+                  <a:srgbClr val="000000"/>
+                </a:solidFill>
+                <a:latin typeface="Consolas" panose="020B0609020204030204" pitchFamily="49" charset="0"/>
+              </a:rPr>
+              <a:t>random_device</a:t>
+            </a:r>
+            <a:r>
+              <a:rPr lang="en-US" sz="2800" dirty="0">
+                <a:solidFill>
+                  <a:srgbClr val="000000"/>
+                </a:solidFill>
+                <a:latin typeface="Consolas" panose="020B0609020204030204" pitchFamily="49" charset="0"/>
+              </a:rPr>
+              <a:t>{}();</a:t>
+            </a:r>
+          </a:p>
+          <a:p>
+            <a:r>
+              <a:rPr lang="en-US" sz="2800" dirty="0">
+                <a:solidFill>
+                  <a:srgbClr val="0000FF"/>
+                </a:solidFill>
+                <a:latin typeface="Consolas" panose="020B0609020204030204" pitchFamily="49" charset="0"/>
+              </a:rPr>
               <a:t>if</a:t>
             </a:r>
             <a:r>
@@ -9275,23 +9309,61 @@
               <a:t> (</a:t>
             </a:r>
             <a:r>
+              <a:rPr lang="en-US" sz="2800" dirty="0" err="1">
+                <a:solidFill>
+                  <a:srgbClr val="000000"/>
+                </a:solidFill>
+                <a:latin typeface="Consolas" panose="020B0609020204030204" pitchFamily="49" charset="0"/>
+              </a:rPr>
+              <a:t>val</a:t>
+            </a:r>
+            <a:r>
+              <a:rPr lang="en-US" sz="2800" dirty="0">
+                <a:solidFill>
+                  <a:srgbClr val="000000"/>
+                </a:solidFill>
+                <a:latin typeface="Consolas" panose="020B0609020204030204" pitchFamily="49" charset="0"/>
+              </a:rPr>
+              <a:t> &gt; </a:t>
+            </a:r>
+            <a:r>
+              <a:rPr lang="en-US" sz="2800" dirty="0" err="1">
+                <a:solidFill>
+                  <a:srgbClr val="000000"/>
+                </a:solidFill>
+                <a:latin typeface="Consolas" panose="020B0609020204030204" pitchFamily="49" charset="0"/>
+              </a:rPr>
+              <a:t>maxInt</a:t>
+            </a:r>
+            <a:r>
+              <a:rPr lang="en-US" sz="2800" dirty="0">
+                <a:solidFill>
+                  <a:srgbClr val="000000"/>
+                </a:solidFill>
+                <a:latin typeface="Consolas" panose="020B0609020204030204" pitchFamily="49" charset="0"/>
+              </a:rPr>
+              <a:t>) { </a:t>
+            </a:r>
+            <a:r>
               <a:rPr lang="en-US" sz="2800" dirty="0">
                 <a:solidFill>
                   <a:srgbClr val="0000FF"/>
                 </a:solidFill>
                 <a:latin typeface="Consolas" panose="020B0609020204030204" pitchFamily="49" charset="0"/>
               </a:rPr>
-              <a:t>const</a:t>
-            </a:r>
-            <a:r>
-              <a:rPr lang="en-US" sz="2800" dirty="0">
-                <a:solidFill>
-                  <a:srgbClr val="000000"/>
-                </a:solidFill>
-                <a:latin typeface="Consolas" panose="020B0609020204030204" pitchFamily="49" charset="0"/>
-              </a:rPr>
-              <a:t> </a:t>
-            </a:r>
+              <a:t>return</a:t>
+            </a:r>
+            <a:r>
+              <a:rPr lang="en-US" sz="2800" dirty="0">
+                <a:solidFill>
+                  <a:srgbClr val="000000"/>
+                </a:solidFill>
+                <a:latin typeface="Consolas" panose="020B0609020204030204" pitchFamily="49" charset="0"/>
+              </a:rPr>
+              <a:t> {}; }</a:t>
+            </a:r>
+          </a:p>
+          <a:p>
             <a:r>
               <a:rPr lang="en-US" sz="2800" dirty="0">
                 <a:solidFill>
@@ -9299,16 +9371,16 @@
                 </a:solidFill>
                 <a:latin typeface="Consolas" panose="020B0609020204030204" pitchFamily="49" charset="0"/>
               </a:rPr>
-              <a:t>auto</a:t>
-            </a:r>
-            <a:r>
-              <a:rPr lang="en-US" sz="2800" dirty="0">
-                <a:solidFill>
-                  <a:srgbClr val="000000"/>
-                </a:solidFill>
-                <a:latin typeface="Consolas" panose="020B0609020204030204" pitchFamily="49" charset="0"/>
-              </a:rPr>
-              <a:t> symbol = </a:t>
+              <a:t>return</a:t>
+            </a:r>
+            <a:r>
+              <a:rPr lang="en-US" sz="2800" dirty="0">
+                <a:solidFill>
+                  <a:srgbClr val="000000"/>
+                </a:solidFill>
+                <a:latin typeface="Consolas" panose="020B0609020204030204" pitchFamily="49" charset="0"/>
+              </a:rPr>
+              <a:t> std::</a:t>
             </a:r>
             <a:r>
               <a:rPr lang="en-US" sz="2800" dirty="0" err="1">
@@ -9317,56 +9389,70 @@
                 </a:solidFill>
                 <a:latin typeface="Consolas" panose="020B0609020204030204" pitchFamily="49" charset="0"/>
               </a:rPr>
-              <a:t>thisArg</a:t>
-            </a:r>
-            <a:r>
-              <a:rPr lang="en-US" sz="2800" dirty="0">
-                <a:solidFill>
-                  <a:srgbClr val="000000"/>
-                </a:solidFill>
-                <a:latin typeface="Consolas" panose="020B0609020204030204" pitchFamily="49" charset="0"/>
-              </a:rPr>
-              <a:t>-&gt;Symbol(); symbol-&gt;Kind()</a:t>
-            </a:r>
-          </a:p>
-          <a:p>
-            <a:r>
-              <a:rPr lang="en-US" sz="2800" dirty="0">
-                <a:solidFill>
-                  <a:srgbClr val="000000"/>
-                </a:solidFill>
-                <a:latin typeface="Consolas" panose="020B0609020204030204" pitchFamily="49" charset="0"/>
-              </a:rPr>
-              <a:t>        == SY_FORMALPARAMETER)</a:t>
-            </a:r>
-          </a:p>
-          <a:p>
-            <a:r>
-              <a:rPr lang="en-US" sz="2800" dirty="0">
-                <a:solidFill>
-                  <a:srgbClr val="000000"/>
-                </a:solidFill>
-                <a:latin typeface="Consolas" panose="020B0609020204030204" pitchFamily="49" charset="0"/>
-              </a:rPr>
-              <a:t>    </a:t>
+              <a:t>make_unique</a:t>
+            </a:r>
+            <a:r>
+              <a:rPr lang="en-US" sz="2800" dirty="0">
+                <a:solidFill>
+                  <a:srgbClr val="000000"/>
+                </a:solidFill>
+                <a:latin typeface="Consolas" panose="020B0609020204030204" pitchFamily="49" charset="0"/>
+              </a:rPr>
+              <a:t>&lt;</a:t>
+            </a:r>
+            <a:r>
+              <a:rPr lang="en-US" sz="2800" dirty="0">
+                <a:solidFill>
+                  <a:srgbClr val="0000FF"/>
+                </a:solidFill>
+                <a:latin typeface="Consolas" panose="020B0609020204030204" pitchFamily="49" charset="0"/>
+              </a:rPr>
+              <a:t>int</a:t>
+            </a:r>
+            <a:r>
+              <a:rPr lang="en-US" sz="2800" dirty="0">
+                <a:solidFill>
+                  <a:srgbClr val="000000"/>
+                </a:solidFill>
+                <a:latin typeface="Consolas" panose="020B0609020204030204" pitchFamily="49" charset="0"/>
+              </a:rPr>
+              <a:t>&gt;(</a:t>
             </a:r>
             <a:r>
               <a:rPr lang="en-US" sz="2800" dirty="0" err="1">
                 <a:solidFill>
-                  <a:srgbClr val="000000"/>
-                </a:solidFill>
-                <a:latin typeface="Consolas" panose="020B0609020204030204" pitchFamily="49" charset="0"/>
-              </a:rPr>
-              <a:t>varToDestroy</a:t>
-            </a:r>
-            <a:r>
-              <a:rPr lang="en-US" sz="2800" dirty="0">
-                <a:solidFill>
-                  <a:srgbClr val="000000"/>
-                </a:solidFill>
-                <a:latin typeface="Consolas" panose="020B0609020204030204" pitchFamily="49" charset="0"/>
-              </a:rPr>
-              <a:t> = </a:t>
+                  <a:srgbClr val="0000FF"/>
+                </a:solidFill>
+                <a:latin typeface="Consolas" panose="020B0609020204030204" pitchFamily="49" charset="0"/>
+              </a:rPr>
+              <a:t>static_cast</a:t>
+            </a:r>
+            <a:r>
+              <a:rPr lang="en-US" sz="2800" dirty="0">
+                <a:solidFill>
+                  <a:srgbClr val="000000"/>
+                </a:solidFill>
+                <a:latin typeface="Consolas" panose="020B0609020204030204" pitchFamily="49" charset="0"/>
+              </a:rPr>
+              <a:t>&lt;</a:t>
+            </a:r>
+            <a:r>
+              <a:rPr lang="en-US" sz="2800" dirty="0">
+                <a:solidFill>
+                  <a:srgbClr val="0000FF"/>
+                </a:solidFill>
+                <a:latin typeface="Consolas" panose="020B0609020204030204" pitchFamily="49" charset="0"/>
+              </a:rPr>
+              <a:t>int</a:t>
+            </a:r>
+            <a:r>
+              <a:rPr lang="en-US" sz="2800" dirty="0">
+                <a:solidFill>
+                  <a:srgbClr val="000000"/>
+                </a:solidFill>
+                <a:latin typeface="Consolas" panose="020B0609020204030204" pitchFamily="49" charset="0"/>
+              </a:rPr>
+              <a:t>&gt;(</a:t>
             </a:r>
             <a:r>
               <a:rPr lang="en-US" sz="2800" dirty="0" err="1">
@@ -9375,16 +9461,27 @@
                 </a:solidFill>
                 <a:latin typeface="Consolas" panose="020B0609020204030204" pitchFamily="49" charset="0"/>
               </a:rPr>
-              <a:t>FindVar</a:t>
-            </a:r>
-            <a:r>
-              <a:rPr lang="en-US" sz="2800" dirty="0">
-                <a:solidFill>
-                  <a:srgbClr val="000000"/>
-                </a:solidFill>
-                <a:latin typeface="Consolas" panose="020B0609020204030204" pitchFamily="49" charset="0"/>
-              </a:rPr>
-              <a:t>(symbol);</a:t>
+              <a:t>val</a:t>
+            </a:r>
+            <a:r>
+              <a:rPr lang="en-US" sz="2800" dirty="0">
+                <a:solidFill>
+                  <a:srgbClr val="000000"/>
+                </a:solidFill>
+                <a:latin typeface="Consolas" panose="020B0609020204030204" pitchFamily="49" charset="0"/>
+              </a:rPr>
+              <a:t>));</a:t>
+            </a:r>
+          </a:p>
+          <a:p>
+            <a:r>
+              <a:rPr lang="en-US" sz="2800" dirty="0">
+                <a:solidFill>
+                  <a:srgbClr val="000000"/>
+                </a:solidFill>
+                <a:latin typeface="Consolas" panose="020B0609020204030204" pitchFamily="49" charset="0"/>
+              </a:rPr>
+              <a:t>}</a:t>
             </a:r>
             <a:endParaRPr lang="en-US" sz="2800" b="0" dirty="0">
               <a:solidFill>
@@ -9399,7 +9496,7 @@
     </p:spTree>
     <p:extLst>
       <p:ext uri="{BB962C8B-B14F-4D97-AF65-F5344CB8AC3E}">
-        <p14:creationId xmlns:p14="http://schemas.microsoft.com/office/powerpoint/2010/main" val="2342662362"/>
+        <p14:creationId xmlns:p14="http://schemas.microsoft.com/office/powerpoint/2010/main" val="1163212329"/>
       </p:ext>
     </p:extLst>
   </p:cSld>
@@ -15024,7 +15121,7 @@
           <a:p>
             <a:r>
               <a:rPr lang="en-US" dirty="0"/>
-              <a:t>C++17 Library Features</a:t>
+              <a:t>Library Features</a:t>
             </a:r>
           </a:p>
         </p:txBody>

</xml_diff>